<commit_message>
Separated core files. Now work in framework
Signed-off-by: iconstudio <yoyofa2@hotmail.com>
</commit_message>
<xml_diff>
--- a/slides/2017_2DGP_1차발표.pptx
+++ b/slides/2017_2DGP_1차발표.pptx
@@ -5,10 +5,10 @@
     <p:sldMasterId id="2147484044" r:id="rId1"/>
   </p:sldMasterIdLst>
   <p:notesMasterIdLst>
-    <p:notesMasterId r:id="rId13"/>
+    <p:notesMasterId r:id="rId14"/>
   </p:notesMasterIdLst>
   <p:handoutMasterIdLst>
-    <p:handoutMasterId r:id="rId14"/>
+    <p:handoutMasterId r:id="rId15"/>
   </p:handoutMasterIdLst>
   <p:sldIdLst>
     <p:sldId id="256" r:id="rId2"/>
@@ -21,47 +21,48 @@
     <p:sldId id="268" r:id="rId9"/>
     <p:sldId id="267" r:id="rId10"/>
     <p:sldId id="270" r:id="rId11"/>
-    <p:sldId id="269" r:id="rId12"/>
+    <p:sldId id="271" r:id="rId12"/>
+    <p:sldId id="269" r:id="rId13"/>
   </p:sldIdLst>
   <p:sldSz cx="9144000" cy="6858000" type="screen4x3"/>
   <p:notesSz cx="6858000" cy="9144000"/>
   <p:embeddedFontLst>
     <p:embeddedFont>
+      <p:font typeface="맑은 고딕" panose="020B0503020000020004" pitchFamily="50" charset="-127"/>
+      <p:regular r:id="rId16"/>
+      <p:bold r:id="rId17"/>
+    </p:embeddedFont>
+    <p:embeddedFont>
+      <p:font typeface="Franklin Gothic Book" panose="020B0503020102020204" pitchFamily="34" charset="0"/>
+      <p:regular r:id="rId18"/>
+      <p:italic r:id="rId19"/>
+    </p:embeddedFont>
+    <p:embeddedFont>
+      <p:font typeface="HY신명조" panose="02030600000101010101" pitchFamily="18" charset="-127"/>
+      <p:regular r:id="rId20"/>
+    </p:embeddedFont>
+    <p:embeddedFont>
+      <p:font typeface="-윤고딕310" panose="02030504000101010101" pitchFamily="18" charset="-127"/>
+      <p:regular r:id="rId21"/>
+    </p:embeddedFont>
+    <p:embeddedFont>
       <p:font typeface="Rage Italic" panose="03070502040507070304" pitchFamily="66" charset="0"/>
-      <p:regular r:id="rId15"/>
+      <p:regular r:id="rId22"/>
     </p:embeddedFont>
     <p:embeddedFont>
       <p:font typeface="Constantia" panose="02030602050306030303" pitchFamily="18" charset="0"/>
-      <p:regular r:id="rId16"/>
-      <p:bold r:id="rId17"/>
-      <p:italic r:id="rId18"/>
-      <p:boldItalic r:id="rId19"/>
+      <p:regular r:id="rId23"/>
+      <p:bold r:id="rId24"/>
+      <p:italic r:id="rId25"/>
+      <p:boldItalic r:id="rId26"/>
     </p:embeddedFont>
     <p:embeddedFont>
       <p:font typeface="-윤고딕320" panose="02030504000101010101" pitchFamily="18" charset="-127"/>
-      <p:regular r:id="rId20"/>
+      <p:regular r:id="rId27"/>
     </p:embeddedFont>
     <p:embeddedFont>
       <p:font typeface="Brush Script MT" panose="03060802040406070304" pitchFamily="66" charset="0"/>
-      <p:italic r:id="rId21"/>
-    </p:embeddedFont>
-    <p:embeddedFont>
-      <p:font typeface="-윤고딕310" panose="02030504000101010101" pitchFamily="18" charset="-127"/>
-      <p:regular r:id="rId22"/>
-    </p:embeddedFont>
-    <p:embeddedFont>
-      <p:font typeface="맑은 고딕" panose="020B0503020000020004" pitchFamily="50" charset="-127"/>
-      <p:regular r:id="rId23"/>
-      <p:bold r:id="rId24"/>
-    </p:embeddedFont>
-    <p:embeddedFont>
-      <p:font typeface="Franklin Gothic Book" panose="020B0503020102020204" pitchFamily="34" charset="0"/>
-      <p:regular r:id="rId25"/>
-      <p:italic r:id="rId26"/>
-    </p:embeddedFont>
-    <p:embeddedFont>
-      <p:font typeface="HY신명조" panose="02030600000101010101" pitchFamily="18" charset="-127"/>
-      <p:regular r:id="rId27"/>
+      <p:italic r:id="rId28"/>
     </p:embeddedFont>
   </p:embeddedFontLst>
   <p:defaultTextStyle>
@@ -244,7 +245,7 @@
           <a:p>
             <a:fld id="{8F1DCB68-D71C-4438-9E18-1A39E8F98C0B}" type="datetime1">
               <a:rPr lang="ko-KR" altLang="en-US" smtClean="0"/>
-              <a:t>2017-10-16</a:t>
+              <a:t>2017-10-17</a:t>
             </a:fld>
             <a:endParaRPr lang="ko-KR" altLang="en-US"/>
           </a:p>
@@ -410,7 +411,7 @@
           <a:p>
             <a:fld id="{63FC2A86-C442-46A0-A683-343668E3757C}" type="datetime1">
               <a:rPr lang="ko-KR" altLang="en-US" smtClean="0"/>
-              <a:t>2017-10-16</a:t>
+              <a:t>2017-10-17</a:t>
             </a:fld>
             <a:endParaRPr lang="ko-KR" altLang="en-US"/>
           </a:p>
@@ -1474,7 +1475,7 @@
           <a:p>
             <a:fld id="{C4C21969-2D44-4836-8054-FEC5EC083A94}" type="datetime1">
               <a:rPr lang="ko-KR" altLang="en-US" smtClean="0"/>
-              <a:t>2017-10-16</a:t>
+              <a:t>2017-10-17</a:t>
             </a:fld>
             <a:endParaRPr lang="ko-KR" altLang="en-US"/>
           </a:p>
@@ -1661,7 +1662,7 @@
           <a:p>
             <a:fld id="{32EDA418-6416-4039-85B1-BA4CF1FD94DE}" type="datetime1">
               <a:rPr lang="ko-KR" altLang="en-US" smtClean="0"/>
-              <a:t>2017-10-16</a:t>
+              <a:t>2017-10-17</a:t>
             </a:fld>
             <a:endParaRPr lang="ko-KR" altLang="en-US"/>
           </a:p>
@@ -1848,7 +1849,7 @@
           <a:p>
             <a:fld id="{879D85B1-5D19-4B8C-B403-10E52B96C9A2}" type="datetime1">
               <a:rPr lang="ko-KR" altLang="en-US" smtClean="0"/>
-              <a:t>2017-10-16</a:t>
+              <a:t>2017-10-17</a:t>
             </a:fld>
             <a:endParaRPr lang="ko-KR" altLang="en-US"/>
           </a:p>
@@ -2021,7 +2022,7 @@
           <a:p>
             <a:fld id="{8998F1EC-F01B-4CCC-A0E8-CD7012E5E6C0}" type="datetime1">
               <a:rPr lang="ko-KR" altLang="en-US" smtClean="0"/>
-              <a:t>2017-10-16</a:t>
+              <a:t>2017-10-17</a:t>
             </a:fld>
             <a:endParaRPr lang="ko-KR" altLang="en-US"/>
           </a:p>
@@ -2268,7 +2269,7 @@
           <a:p>
             <a:fld id="{52787909-DE3C-4D58-A58F-9F026A606388}" type="datetime1">
               <a:rPr lang="ko-KR" altLang="en-US" smtClean="0"/>
-              <a:t>2017-10-16</a:t>
+              <a:t>2017-10-17</a:t>
             </a:fld>
             <a:endParaRPr lang="ko-KR" altLang="en-US"/>
           </a:p>
@@ -2389,7 +2390,7 @@
           <a:p>
             <a:fld id="{7666CBAD-7B00-470A-90AD-5135048686B9}" type="datetime1">
               <a:rPr lang="ko-KR" altLang="en-US" smtClean="0"/>
-              <a:t>2017-10-16</a:t>
+              <a:t>2017-10-17</a:t>
             </a:fld>
             <a:endParaRPr lang="ko-KR" altLang="en-US"/>
           </a:p>
@@ -2770,7 +2771,7 @@
           <a:p>
             <a:fld id="{0CF463A9-D5DB-4824-87E2-C1D0AC51B4AF}" type="datetime1">
               <a:rPr lang="ko-KR" altLang="en-US" smtClean="0"/>
-              <a:t>2017-10-16</a:t>
+              <a:t>2017-10-17</a:t>
             </a:fld>
             <a:endParaRPr lang="ko-KR" altLang="en-US"/>
           </a:p>
@@ -3005,7 +3006,7 @@
           <a:p>
             <a:fld id="{C70BB2E4-12BC-438F-94A6-F50FE8A3D88C}" type="datetime1">
               <a:rPr lang="ko-KR" altLang="en-US" smtClean="0"/>
-              <a:t>2017-10-16</a:t>
+              <a:t>2017-10-17</a:t>
             </a:fld>
             <a:endParaRPr lang="ko-KR" altLang="en-US"/>
           </a:p>
@@ -3103,7 +3104,7 @@
           <a:p>
             <a:fld id="{9544425C-B7EA-494A-BDEE-4AA66243A9BD}" type="datetime1">
               <a:rPr lang="ko-KR" altLang="en-US" smtClean="0"/>
-              <a:t>2017-10-16</a:t>
+              <a:t>2017-10-17</a:t>
             </a:fld>
             <a:endParaRPr lang="ko-KR" altLang="en-US"/>
           </a:p>
@@ -3938,7 +3939,7 @@
           <a:p>
             <a:fld id="{EC5C1134-AEED-45C1-AFDF-DDF26E0C6587}" type="datetime1">
               <a:rPr lang="ko-KR" altLang="en-US" smtClean="0"/>
-              <a:t>2017-10-16</a:t>
+              <a:t>2017-10-17</a:t>
             </a:fld>
             <a:endParaRPr lang="ko-KR" altLang="en-US"/>
           </a:p>
@@ -4777,7 +4778,7 @@
           <a:p>
             <a:fld id="{971A1825-C447-468B-B9C9-6B7674910854}" type="datetime1">
               <a:rPr lang="ko-KR" altLang="en-US" smtClean="0"/>
-              <a:t>2017-10-16</a:t>
+              <a:t>2017-10-17</a:t>
             </a:fld>
             <a:endParaRPr lang="ko-KR" altLang="en-US"/>
           </a:p>
@@ -5439,7 +5440,7 @@
           <a:p>
             <a:fld id="{4E0EA9FF-3011-4849-B3DE-625476BF3408}" type="datetime1">
               <a:rPr lang="ko-KR" altLang="en-US" smtClean="0"/>
-              <a:t>2017-10-16</a:t>
+              <a:t>2017-10-17</a:t>
             </a:fld>
             <a:endParaRPr lang="ko-KR" altLang="en-US"/>
           </a:p>
@@ -6078,13 +6079,13 @@
   <p:clrMapOvr>
     <a:masterClrMapping/>
   </p:clrMapOvr>
-  <mc:AlternateContent xmlns:mc="http://schemas.openxmlformats.org/markup-compatibility/2006">
-    <mc:Choice xmlns:p14="http://schemas.microsoft.com/office/powerpoint/2010/main" Requires="p14">
+  <mc:AlternateContent xmlns:mc="http://schemas.openxmlformats.org/markup-compatibility/2006" xmlns:p14="http://schemas.microsoft.com/office/powerpoint/2010/main">
+    <mc:Choice Requires="p14">
       <p:transition spd="med" p14:dur="700">
         <p:fade/>
       </p:transition>
     </mc:Choice>
-    <mc:Fallback>
+    <mc:Fallback xmlns="">
       <p:transition spd="med">
         <p:fade/>
       </p:transition>
@@ -6129,7 +6130,7 @@
         </p:nvSpPr>
         <p:spPr>
           <a:xfrm>
-            <a:off x="1095023" y="620688"/>
+            <a:off x="1115616" y="980728"/>
             <a:ext cx="6965245" cy="1202485"/>
           </a:xfrm>
         </p:spPr>
@@ -6161,14 +6162,14 @@
             <p:ph idx="1"/>
             <p:extLst>
               <p:ext uri="{D42A27DB-BD31-4B8C-83A1-F6EECF244321}">
-                <p14:modId xmlns:p14="http://schemas.microsoft.com/office/powerpoint/2010/main" val="3718373505"/>
+                <p14:modId xmlns:p14="http://schemas.microsoft.com/office/powerpoint/2010/main" val="250437262"/>
               </p:ext>
             </p:extLst>
           </p:nvPr>
         </p:nvGraphicFramePr>
         <p:xfrm>
-          <a:off x="755576" y="1340768"/>
-          <a:ext cx="7634432" cy="4437878"/>
+          <a:off x="827584" y="1844818"/>
+          <a:ext cx="7488832" cy="3888437"/>
         </p:xfrm>
         <a:graphic>
           <a:graphicData uri="http://schemas.openxmlformats.org/drawingml/2006/table">
@@ -6184,11 +6185,11 @@
                 <a:tableStyleId>{5C22544A-7EE6-4342-B048-85BDC9FD1C3A}</a:tableStyleId>
               </a:tblPr>
               <a:tblGrid>
-                <a:gridCol w="720080"/>
-                <a:gridCol w="1698068"/>
-                <a:gridCol w="5216284"/>
+                <a:gridCol w="706347"/>
+                <a:gridCol w="1695233"/>
+                <a:gridCol w="5087252"/>
               </a:tblGrid>
-              <a:tr h="426238">
+              <a:tr h="442817">
                 <a:tc>
                   <a:txBody>
                     <a:bodyPr/>
@@ -6260,7 +6261,7 @@
                   <a:tcPr marL="111605" marR="111605" marT="55802" marB="55802" anchor="ctr"/>
                 </a:tc>
               </a:tr>
-              <a:tr h="178502">
+              <a:tr h="1165274">
                 <a:tc>
                   <a:txBody>
                     <a:bodyPr/>
@@ -6294,25 +6295,244 @@
                     <a:bodyPr/>
                     <a:lstStyle/>
                     <a:p>
-                      <a:pPr marL="0" indent="0" latinLnBrk="1">
+                      <a:pPr marL="0" indent="0" algn="ctr" latinLnBrk="1">
                         <a:buFont typeface="Arial" panose="020B0604020202020204" pitchFamily="34" charset="0"/>
                         <a:buNone/>
                       </a:pPr>
-                      <a:endParaRPr lang="ko-KR" altLang="en-US" sz="1400" dirty="0">
+                      <a:r>
+                        <a:rPr lang="ko-KR" altLang="en-US" sz="1200" dirty="0" smtClean="0">
+                          <a:latin typeface="-윤고딕310" panose="02030504000101010101" pitchFamily="18" charset="-127"/>
+                          <a:ea typeface="-윤고딕310" panose="02030504000101010101" pitchFamily="18" charset="-127"/>
+                        </a:rPr>
+                        <a:t>기본적 메커니즘</a:t>
+                      </a:r>
+                      <a:endParaRPr lang="en-US" altLang="ko-KR" sz="1200" dirty="0" smtClean="0">
+                        <a:latin typeface="-윤고딕310" panose="02030504000101010101" pitchFamily="18" charset="-127"/>
+                        <a:ea typeface="-윤고딕310" panose="02030504000101010101" pitchFamily="18" charset="-127"/>
+                      </a:endParaRPr>
+                    </a:p>
+                    <a:p>
+                      <a:pPr marL="0" indent="0" algn="ctr" latinLnBrk="1">
+                        <a:buFont typeface="Arial" panose="020B0604020202020204" pitchFamily="34" charset="0"/>
+                        <a:buNone/>
+                      </a:pPr>
+                      <a:r>
+                        <a:rPr lang="ko-KR" altLang="en-US" sz="1200" dirty="0" smtClean="0">
+                          <a:latin typeface="-윤고딕310" panose="02030504000101010101" pitchFamily="18" charset="-127"/>
+                          <a:ea typeface="-윤고딕310" panose="02030504000101010101" pitchFamily="18" charset="-127"/>
+                        </a:rPr>
+                        <a:t>지형과 중력</a:t>
+                      </a:r>
+                      <a:endParaRPr lang="ko-KR" altLang="en-US" sz="1200" dirty="0">
                         <a:latin typeface="-윤고딕310" panose="02030504000101010101" pitchFamily="18" charset="-127"/>
                         <a:ea typeface="-윤고딕310" panose="02030504000101010101" pitchFamily="18" charset="-127"/>
                       </a:endParaRPr>
                     </a:p>
                   </a:txBody>
-                  <a:tcPr marL="111605" marR="111605" marT="55802" marB="55802"/>
+                  <a:tcPr marL="111605" marR="111605" marT="55802" marB="55802" anchor="ctr"/>
                 </a:tc>
                 <a:tc>
                   <a:txBody>
                     <a:bodyPr/>
                     <a:lstStyle/>
                     <a:p>
-                      <a:pPr latinLnBrk="1"/>
-                      <a:endParaRPr lang="ko-KR" altLang="en-US" sz="1400" dirty="0">
+                      <a:pPr marL="171450" indent="-171450" latinLnBrk="1">
+                        <a:buFont typeface="Arial" panose="020B0604020202020204" pitchFamily="34" charset="0"/>
+                        <a:buChar char="•"/>
+                      </a:pPr>
+                      <a:r>
+                        <a:rPr lang="ko-KR" altLang="en-US" sz="1200" dirty="0" smtClean="0">
+                          <a:latin typeface="-윤고딕310" panose="02030504000101010101" pitchFamily="18" charset="-127"/>
+                          <a:ea typeface="-윤고딕310" panose="02030504000101010101" pitchFamily="18" charset="-127"/>
+                        </a:rPr>
+                        <a:t>필요한 객체를 모두 정의하고 상속 관계를 분명히 한다</a:t>
+                      </a:r>
+                      <a:r>
+                        <a:rPr lang="en-US" altLang="ko-KR" sz="1200" dirty="0" smtClean="0">
+                          <a:latin typeface="-윤고딕310" panose="02030504000101010101" pitchFamily="18" charset="-127"/>
+                          <a:ea typeface="-윤고딕310" panose="02030504000101010101" pitchFamily="18" charset="-127"/>
+                        </a:rPr>
+                        <a:t>.  </a:t>
+                      </a:r>
+                      <a:r>
+                        <a:rPr lang="ko-KR" altLang="en-US" sz="1200" dirty="0" smtClean="0">
+                          <a:latin typeface="-윤고딕310" panose="02030504000101010101" pitchFamily="18" charset="-127"/>
+                          <a:ea typeface="-윤고딕310" panose="02030504000101010101" pitchFamily="18" charset="-127"/>
+                        </a:rPr>
+                        <a:t>모든 객체들은 하나의 중력 객체를 상속한다</a:t>
+                      </a:r>
+                      <a:r>
+                        <a:rPr lang="en-US" altLang="ko-KR" sz="1200" dirty="0" smtClean="0">
+                          <a:latin typeface="-윤고딕310" panose="02030504000101010101" pitchFamily="18" charset="-127"/>
+                          <a:ea typeface="-윤고딕310" panose="02030504000101010101" pitchFamily="18" charset="-127"/>
+                        </a:rPr>
+                        <a:t>.</a:t>
+                      </a:r>
+                      <a:r>
+                        <a:rPr lang="en-US" altLang="ko-KR" sz="1200" baseline="0" dirty="0" smtClean="0">
+                          <a:latin typeface="-윤고딕310" panose="02030504000101010101" pitchFamily="18" charset="-127"/>
+                          <a:ea typeface="-윤고딕310" panose="02030504000101010101" pitchFamily="18" charset="-127"/>
+                        </a:rPr>
+                        <a:t> </a:t>
+                      </a:r>
+                      <a:r>
+                        <a:rPr lang="ko-KR" altLang="en-US" sz="1200" baseline="0" dirty="0" smtClean="0">
+                          <a:latin typeface="-윤고딕310" panose="02030504000101010101" pitchFamily="18" charset="-127"/>
+                          <a:ea typeface="-윤고딕310" panose="02030504000101010101" pitchFamily="18" charset="-127"/>
+                        </a:rPr>
+                        <a:t>메소드들 역시 규격화된 이름으로 정리한다</a:t>
+                      </a:r>
+                      <a:r>
+                        <a:rPr lang="en-US" altLang="ko-KR" sz="1200" baseline="0" dirty="0" smtClean="0">
+                          <a:latin typeface="-윤고딕310" panose="02030504000101010101" pitchFamily="18" charset="-127"/>
+                          <a:ea typeface="-윤고딕310" panose="02030504000101010101" pitchFamily="18" charset="-127"/>
+                        </a:rPr>
+                        <a:t>.</a:t>
+                      </a:r>
+                    </a:p>
+                    <a:p>
+                      <a:pPr marL="171450" marR="0" indent="-171450" algn="l" defTabSz="914400" rtl="0" eaLnBrk="1" fontAlgn="auto" latinLnBrk="1" hangingPunct="1">
+                        <a:lnSpc>
+                          <a:spcPct val="100000"/>
+                        </a:lnSpc>
+                        <a:spcBef>
+                          <a:spcPts val="0"/>
+                        </a:spcBef>
+                        <a:spcAft>
+                          <a:spcPts val="0"/>
+                        </a:spcAft>
+                        <a:buClrTx/>
+                        <a:buSzTx/>
+                        <a:buFont typeface="Arial" panose="020B0604020202020204" pitchFamily="34" charset="0"/>
+                        <a:buChar char="•"/>
+                        <a:tabLst/>
+                        <a:defRPr/>
+                      </a:pPr>
+                      <a:r>
+                        <a:rPr lang="ko-KR" altLang="en-US" sz="1200" dirty="0" smtClean="0">
+                          <a:latin typeface="-윤고딕310" panose="02030504000101010101" pitchFamily="18" charset="-127"/>
+                          <a:ea typeface="-윤고딕310" panose="02030504000101010101" pitchFamily="18" charset="-127"/>
+                        </a:rPr>
+                        <a:t>지형 객체의 특수화를 한다</a:t>
+                      </a:r>
+                      <a:r>
+                        <a:rPr lang="en-US" altLang="ko-KR" sz="1200" dirty="0" smtClean="0">
+                          <a:latin typeface="-윤고딕310" panose="02030504000101010101" pitchFamily="18" charset="-127"/>
+                          <a:ea typeface="-윤고딕310" panose="02030504000101010101" pitchFamily="18" charset="-127"/>
+                        </a:rPr>
+                        <a:t>.</a:t>
+                      </a:r>
+                      <a:r>
+                        <a:rPr lang="ko-KR" altLang="en-US" sz="1200" dirty="0" smtClean="0">
+                          <a:latin typeface="-윤고딕310" panose="02030504000101010101" pitchFamily="18" charset="-127"/>
+                          <a:ea typeface="-윤고딕310" panose="02030504000101010101" pitchFamily="18" charset="-127"/>
+                        </a:rPr>
+                        <a:t> 중력 객체</a:t>
+                      </a:r>
+                      <a:r>
+                        <a:rPr lang="en-US" altLang="ko-KR" sz="1200" dirty="0" smtClean="0">
+                          <a:latin typeface="-윤고딕310" panose="02030504000101010101" pitchFamily="18" charset="-127"/>
+                          <a:ea typeface="-윤고딕310" panose="02030504000101010101" pitchFamily="18" charset="-127"/>
+                        </a:rPr>
+                        <a:t>-&gt;</a:t>
+                      </a:r>
+                      <a:r>
+                        <a:rPr lang="ko-KR" altLang="en-US" sz="1200" dirty="0" smtClean="0">
+                          <a:latin typeface="-윤고딕310" panose="02030504000101010101" pitchFamily="18" charset="-127"/>
+                          <a:ea typeface="-윤고딕310" panose="02030504000101010101" pitchFamily="18" charset="-127"/>
+                        </a:rPr>
+                        <a:t>블록</a:t>
+                      </a:r>
+                      <a:r>
+                        <a:rPr lang="en-US" altLang="ko-KR" sz="1200" dirty="0" smtClean="0">
+                          <a:latin typeface="-윤고딕310" panose="02030504000101010101" pitchFamily="18" charset="-127"/>
+                          <a:ea typeface="-윤고딕310" panose="02030504000101010101" pitchFamily="18" charset="-127"/>
+                        </a:rPr>
+                        <a:t>-&gt;</a:t>
+                      </a:r>
+                      <a:r>
+                        <a:rPr lang="ko-KR" altLang="en-US" sz="1200" dirty="0" smtClean="0">
+                          <a:latin typeface="-윤고딕310" panose="02030504000101010101" pitchFamily="18" charset="-127"/>
+                          <a:ea typeface="-윤고딕310" panose="02030504000101010101" pitchFamily="18" charset="-127"/>
+                        </a:rPr>
+                        <a:t>나무</a:t>
+                      </a:r>
+                      <a:r>
+                        <a:rPr lang="en-US" altLang="ko-KR" sz="1200" dirty="0" smtClean="0">
+                          <a:latin typeface="-윤고딕310" panose="02030504000101010101" pitchFamily="18" charset="-127"/>
+                          <a:ea typeface="-윤고딕310" panose="02030504000101010101" pitchFamily="18" charset="-127"/>
+                        </a:rPr>
+                        <a:t>, </a:t>
+                      </a:r>
+                      <a:r>
+                        <a:rPr lang="ko-KR" altLang="en-US" sz="1200" dirty="0" smtClean="0">
+                          <a:latin typeface="-윤고딕310" panose="02030504000101010101" pitchFamily="18" charset="-127"/>
+                          <a:ea typeface="-윤고딕310" panose="02030504000101010101" pitchFamily="18" charset="-127"/>
+                        </a:rPr>
+                        <a:t>벽돌</a:t>
+                      </a:r>
+                      <a:r>
+                        <a:rPr lang="en-US" altLang="ko-KR" sz="1200" dirty="0" smtClean="0">
+                          <a:latin typeface="-윤고딕310" panose="02030504000101010101" pitchFamily="18" charset="-127"/>
+                          <a:ea typeface="-윤고딕310" panose="02030504000101010101" pitchFamily="18" charset="-127"/>
+                        </a:rPr>
+                        <a:t>, </a:t>
+                      </a:r>
+                      <a:r>
+                        <a:rPr lang="ko-KR" altLang="en-US" sz="1200" dirty="0" smtClean="0">
+                          <a:latin typeface="-윤고딕310" panose="02030504000101010101" pitchFamily="18" charset="-127"/>
+                          <a:ea typeface="-윤고딕310" panose="02030504000101010101" pitchFamily="18" charset="-127"/>
+                        </a:rPr>
+                        <a:t>땅</a:t>
+                      </a:r>
+                      <a:r>
+                        <a:rPr lang="en-US" altLang="ko-KR" sz="1200" dirty="0" smtClean="0">
+                          <a:latin typeface="-윤고딕310" panose="02030504000101010101" pitchFamily="18" charset="-127"/>
+                          <a:ea typeface="-윤고딕310" panose="02030504000101010101" pitchFamily="18" charset="-127"/>
+                        </a:rPr>
+                        <a:t>, …</a:t>
+                      </a:r>
+                    </a:p>
+                    <a:p>
+                      <a:pPr marL="171450" marR="0" indent="-171450" algn="l" defTabSz="914400" rtl="0" eaLnBrk="1" fontAlgn="auto" latinLnBrk="1" hangingPunct="1">
+                        <a:lnSpc>
+                          <a:spcPct val="100000"/>
+                        </a:lnSpc>
+                        <a:spcBef>
+                          <a:spcPts val="0"/>
+                        </a:spcBef>
+                        <a:spcAft>
+                          <a:spcPts val="0"/>
+                        </a:spcAft>
+                        <a:buClrTx/>
+                        <a:buSzTx/>
+                        <a:buFont typeface="Arial" panose="020B0604020202020204" pitchFamily="34" charset="0"/>
+                        <a:buChar char="•"/>
+                        <a:tabLst/>
+                        <a:defRPr/>
+                      </a:pPr>
+                      <a:r>
+                        <a:rPr lang="ko-KR" altLang="en-US" sz="1200" dirty="0" smtClean="0">
+                          <a:latin typeface="-윤고딕310" panose="02030504000101010101" pitchFamily="18" charset="-127"/>
+                          <a:ea typeface="-윤고딕310" panose="02030504000101010101" pitchFamily="18" charset="-127"/>
+                        </a:rPr>
+                        <a:t>모든 개체는 중력이 작동한다</a:t>
+                      </a:r>
+                      <a:r>
+                        <a:rPr lang="en-US" altLang="ko-KR" sz="1200" dirty="0" smtClean="0">
+                          <a:latin typeface="-윤고딕310" panose="02030504000101010101" pitchFamily="18" charset="-127"/>
+                          <a:ea typeface="-윤고딕310" panose="02030504000101010101" pitchFamily="18" charset="-127"/>
+                        </a:rPr>
+                        <a:t>. </a:t>
+                      </a:r>
+                      <a:r>
+                        <a:rPr lang="ko-KR" altLang="en-US" sz="1200" dirty="0" smtClean="0">
+                          <a:latin typeface="-윤고딕310" panose="02030504000101010101" pitchFamily="18" charset="-127"/>
+                          <a:ea typeface="-윤고딕310" panose="02030504000101010101" pitchFamily="18" charset="-127"/>
+                        </a:rPr>
+                        <a:t>충돌 처리를 위해 개체 리스트가 들어있는 이름으로 구분된 사전에서 반복문을 돌려서 처리한다</a:t>
+                      </a:r>
+                      <a:endParaRPr lang="ko-KR" altLang="en-US" sz="1200" dirty="0">
                         <a:latin typeface="-윤고딕310" panose="02030504000101010101" pitchFamily="18" charset="-127"/>
                         <a:ea typeface="-윤고딕310" panose="02030504000101010101" pitchFamily="18" charset="-127"/>
                       </a:endParaRPr>
@@ -6321,7 +6541,7 @@
                   <a:tcPr marL="111605" marR="111605" marT="55802" marB="55802"/>
                 </a:tc>
               </a:tr>
-              <a:tr h="222662">
+              <a:tr h="702124">
                 <a:tc>
                   <a:txBody>
                     <a:bodyPr/>
@@ -6355,25 +6575,118 @@
                     <a:bodyPr/>
                     <a:lstStyle/>
                     <a:p>
-                      <a:pPr marL="0" indent="0" latinLnBrk="1">
+                      <a:pPr marL="0" indent="0" algn="ctr" latinLnBrk="1">
                         <a:buFont typeface="Arial" panose="020B0604020202020204" pitchFamily="34" charset="0"/>
                         <a:buNone/>
                       </a:pPr>
-                      <a:endParaRPr lang="ko-KR" altLang="en-US" sz="1400" dirty="0">
+                      <a:r>
+                        <a:rPr lang="ko-KR" altLang="en-US" sz="1200" dirty="0" smtClean="0">
+                          <a:latin typeface="-윤고딕310" panose="02030504000101010101" pitchFamily="18" charset="-127"/>
+                          <a:ea typeface="-윤고딕310" panose="02030504000101010101" pitchFamily="18" charset="-127"/>
+                        </a:rPr>
+                        <a:t>리소스 수집과 테스트</a:t>
+                      </a:r>
+                      <a:endParaRPr lang="ko-KR" altLang="en-US" sz="1200" dirty="0">
                         <a:latin typeface="-윤고딕310" panose="02030504000101010101" pitchFamily="18" charset="-127"/>
                         <a:ea typeface="-윤고딕310" panose="02030504000101010101" pitchFamily="18" charset="-127"/>
                       </a:endParaRPr>
                     </a:p>
                   </a:txBody>
-                  <a:tcPr marL="111605" marR="111605" marT="55802" marB="55802"/>
+                  <a:tcPr marL="111605" marR="111605" marT="55802" marB="55802" anchor="ctr"/>
                 </a:tc>
                 <a:tc>
                   <a:txBody>
                     <a:bodyPr/>
                     <a:lstStyle/>
                     <a:p>
-                      <a:pPr latinLnBrk="1"/>
-                      <a:endParaRPr lang="ko-KR" altLang="en-US" sz="1400" dirty="0">
+                      <a:pPr marL="171450" marR="0" indent="-171450" algn="l" defTabSz="914400" rtl="0" eaLnBrk="1" fontAlgn="auto" latinLnBrk="1" hangingPunct="1">
+                        <a:lnSpc>
+                          <a:spcPct val="100000"/>
+                        </a:lnSpc>
+                        <a:spcBef>
+                          <a:spcPts val="0"/>
+                        </a:spcBef>
+                        <a:spcAft>
+                          <a:spcPts val="0"/>
+                        </a:spcAft>
+                        <a:buClrTx/>
+                        <a:buSzTx/>
+                        <a:buFont typeface="Arial" panose="020B0604020202020204" pitchFamily="34" charset="0"/>
+                        <a:buChar char="•"/>
+                        <a:tabLst/>
+                        <a:defRPr/>
+                      </a:pPr>
+                      <a:r>
+                        <a:rPr lang="ko-KR" altLang="en-US" sz="1200" dirty="0" smtClean="0">
+                          <a:latin typeface="-윤고딕310" panose="02030504000101010101" pitchFamily="18" charset="-127"/>
+                          <a:ea typeface="-윤고딕310" panose="02030504000101010101" pitchFamily="18" charset="-127"/>
+                        </a:rPr>
+                        <a:t>필요한 리소스를 구하고 객체들에 적용한다</a:t>
+                      </a:r>
+                      <a:r>
+                        <a:rPr lang="en-US" altLang="ko-KR" sz="1200" dirty="0" smtClean="0">
+                          <a:latin typeface="-윤고딕310" panose="02030504000101010101" pitchFamily="18" charset="-127"/>
+                          <a:ea typeface="-윤고딕310" panose="02030504000101010101" pitchFamily="18" charset="-127"/>
+                        </a:rPr>
+                        <a:t>. </a:t>
+                      </a:r>
+                      <a:r>
+                        <a:rPr lang="ko-KR" altLang="en-US" sz="1200" dirty="0" smtClean="0">
+                          <a:latin typeface="-윤고딕310" panose="02030504000101010101" pitchFamily="18" charset="-127"/>
+                          <a:ea typeface="-윤고딕310" panose="02030504000101010101" pitchFamily="18" charset="-127"/>
+                        </a:rPr>
+                        <a:t>중력을 영향을 받는 객체들이 이미지와 잘 맞는지 테스트한다</a:t>
+                      </a:r>
+                      <a:r>
+                        <a:rPr lang="en-US" altLang="ko-KR" sz="1200" dirty="0" smtClean="0">
+                          <a:latin typeface="-윤고딕310" panose="02030504000101010101" pitchFamily="18" charset="-127"/>
+                          <a:ea typeface="-윤고딕310" panose="02030504000101010101" pitchFamily="18" charset="-127"/>
+                        </a:rPr>
+                        <a:t>. </a:t>
+                      </a:r>
+                      <a:r>
+                        <a:rPr lang="ko-KR" altLang="en-US" sz="1200" dirty="0" smtClean="0">
+                          <a:latin typeface="-윤고딕310" panose="02030504000101010101" pitchFamily="18" charset="-127"/>
+                          <a:ea typeface="-윤고딕310" panose="02030504000101010101" pitchFamily="18" charset="-127"/>
+                        </a:rPr>
+                        <a:t>객체들을 배치하여 실제로 어울리는지</a:t>
+                      </a:r>
+                      <a:r>
+                        <a:rPr lang="en-US" altLang="ko-KR" sz="1200" dirty="0" smtClean="0">
+                          <a:latin typeface="-윤고딕310" panose="02030504000101010101" pitchFamily="18" charset="-127"/>
+                          <a:ea typeface="-윤고딕310" panose="02030504000101010101" pitchFamily="18" charset="-127"/>
+                        </a:rPr>
+                        <a:t>,</a:t>
+                      </a:r>
+                      <a:r>
+                        <a:rPr lang="ko-KR" altLang="en-US" sz="1200" dirty="0" smtClean="0">
+                          <a:latin typeface="-윤고딕310" panose="02030504000101010101" pitchFamily="18" charset="-127"/>
+                          <a:ea typeface="-윤고딕310" panose="02030504000101010101" pitchFamily="18" charset="-127"/>
+                        </a:rPr>
+                        <a:t> 그리고 중력</a:t>
+                      </a:r>
+                      <a:r>
+                        <a:rPr lang="en-US" altLang="ko-KR" sz="1200" dirty="0" smtClean="0">
+                          <a:latin typeface="-윤고딕310" panose="02030504000101010101" pitchFamily="18" charset="-127"/>
+                          <a:ea typeface="-윤고딕310" panose="02030504000101010101" pitchFamily="18" charset="-127"/>
+                        </a:rPr>
+                        <a:t>, </a:t>
+                      </a:r>
+                      <a:r>
+                        <a:rPr lang="ko-KR" altLang="en-US" sz="1200" dirty="0" smtClean="0">
+                          <a:latin typeface="-윤고딕310" panose="02030504000101010101" pitchFamily="18" charset="-127"/>
+                          <a:ea typeface="-윤고딕310" panose="02030504000101010101" pitchFamily="18" charset="-127"/>
+                        </a:rPr>
+                        <a:t>충돌과 속도가 작동하는지 확인한다</a:t>
+                      </a:r>
+                      <a:r>
+                        <a:rPr lang="en-US" altLang="ko-KR" sz="1200" dirty="0" smtClean="0">
+                          <a:latin typeface="-윤고딕310" panose="02030504000101010101" pitchFamily="18" charset="-127"/>
+                          <a:ea typeface="-윤고딕310" panose="02030504000101010101" pitchFamily="18" charset="-127"/>
+                        </a:rPr>
+                        <a:t>.</a:t>
+                      </a:r>
+                      <a:endParaRPr lang="ko-KR" altLang="en-US" sz="1200" dirty="0" smtClean="0">
                         <a:latin typeface="-윤고딕310" panose="02030504000101010101" pitchFamily="18" charset="-127"/>
                         <a:ea typeface="-윤고딕310" panose="02030504000101010101" pitchFamily="18" charset="-127"/>
                       </a:endParaRPr>
@@ -6382,7 +6695,7 @@
                   <a:tcPr marL="111605" marR="111605" marT="55802" marB="55802"/>
                 </a:tc>
               </a:tr>
-              <a:tr h="178502">
+              <a:tr h="519108">
                 <a:tc>
                   <a:txBody>
                     <a:bodyPr/>
@@ -6416,25 +6729,77 @@
                     <a:bodyPr/>
                     <a:lstStyle/>
                     <a:p>
-                      <a:pPr marL="0" indent="0" latinLnBrk="1">
+                      <a:pPr marL="0" indent="0" algn="ctr" latinLnBrk="1">
                         <a:buFont typeface="Arial" panose="020B0604020202020204" pitchFamily="34" charset="0"/>
                         <a:buNone/>
                       </a:pPr>
-                      <a:endParaRPr lang="ko-KR" altLang="en-US" sz="1400" dirty="0">
+                      <a:r>
+                        <a:rPr lang="ko-KR" altLang="en-US" sz="1200" dirty="0" smtClean="0">
+                          <a:latin typeface="-윤고딕310" panose="02030504000101010101" pitchFamily="18" charset="-127"/>
+                          <a:ea typeface="-윤고딕310" panose="02030504000101010101" pitchFamily="18" charset="-127"/>
+                        </a:rPr>
+                        <a:t>플레이어</a:t>
+                      </a:r>
+                      <a:r>
+                        <a:rPr lang="en-US" altLang="ko-KR" sz="1200" baseline="0" dirty="0" smtClean="0">
+                          <a:latin typeface="-윤고딕310" panose="02030504000101010101" pitchFamily="18" charset="-127"/>
+                          <a:ea typeface="-윤고딕310" panose="02030504000101010101" pitchFamily="18" charset="-127"/>
+                        </a:rPr>
+                        <a:t> </a:t>
+                      </a:r>
+                      <a:r>
+                        <a:rPr lang="ko-KR" altLang="en-US" sz="1200" baseline="0" dirty="0" smtClean="0">
+                          <a:latin typeface="-윤고딕310" panose="02030504000101010101" pitchFamily="18" charset="-127"/>
+                          <a:ea typeface="-윤고딕310" panose="02030504000101010101" pitchFamily="18" charset="-127"/>
+                        </a:rPr>
+                        <a:t>객체</a:t>
+                      </a:r>
+                      <a:endParaRPr lang="ko-KR" altLang="en-US" sz="1200" dirty="0">
                         <a:latin typeface="-윤고딕310" panose="02030504000101010101" pitchFamily="18" charset="-127"/>
                         <a:ea typeface="-윤고딕310" panose="02030504000101010101" pitchFamily="18" charset="-127"/>
                       </a:endParaRPr>
                     </a:p>
                   </a:txBody>
-                  <a:tcPr marL="111605" marR="111605" marT="55802" marB="55802"/>
+                  <a:tcPr marL="111605" marR="111605" marT="55802" marB="55802" anchor="ctr"/>
                 </a:tc>
                 <a:tc>
                   <a:txBody>
                     <a:bodyPr/>
                     <a:lstStyle/>
                     <a:p>
-                      <a:pPr latinLnBrk="1"/>
-                      <a:endParaRPr lang="ko-KR" altLang="en-US" sz="1400" dirty="0">
+                      <a:pPr marL="171450" indent="-171450" latinLnBrk="1">
+                        <a:buFont typeface="Arial" panose="020B0604020202020204" pitchFamily="34" charset="0"/>
+                        <a:buChar char="•"/>
+                      </a:pPr>
+                      <a:r>
+                        <a:rPr lang="ko-KR" altLang="en-US" sz="1200" dirty="0" smtClean="0">
+                          <a:latin typeface="-윤고딕310" panose="02030504000101010101" pitchFamily="18" charset="-127"/>
+                          <a:ea typeface="-윤고딕310" panose="02030504000101010101" pitchFamily="18" charset="-127"/>
+                        </a:rPr>
+                        <a:t>플레이어는 키 입력 이벤트를 받아 움직인다</a:t>
+                      </a:r>
+                      <a:r>
+                        <a:rPr lang="en-US" altLang="ko-KR" sz="1200" dirty="0" smtClean="0">
+                          <a:latin typeface="-윤고딕310" panose="02030504000101010101" pitchFamily="18" charset="-127"/>
+                          <a:ea typeface="-윤고딕310" panose="02030504000101010101" pitchFamily="18" charset="-127"/>
+                        </a:rPr>
+                        <a:t>. </a:t>
+                      </a:r>
+                      <a:r>
+                        <a:rPr lang="ko-KR" altLang="en-US" sz="1200" dirty="0" smtClean="0">
+                          <a:latin typeface="-윤고딕310" panose="02030504000101010101" pitchFamily="18" charset="-127"/>
+                          <a:ea typeface="-윤고딕310" panose="02030504000101010101" pitchFamily="18" charset="-127"/>
+                        </a:rPr>
+                        <a:t>누른 키에 따라 행동을 취하는데 일단 움직임만 취하도록 한다</a:t>
+                      </a:r>
+                      <a:r>
+                        <a:rPr lang="en-US" altLang="ko-KR" sz="1200" dirty="0" smtClean="0">
+                          <a:latin typeface="-윤고딕310" panose="02030504000101010101" pitchFamily="18" charset="-127"/>
+                          <a:ea typeface="-윤고딕310" panose="02030504000101010101" pitchFamily="18" charset="-127"/>
+                        </a:rPr>
+                        <a:t>.</a:t>
+                      </a:r>
+                      <a:endParaRPr lang="ko-KR" altLang="en-US" sz="1200" dirty="0">
                         <a:latin typeface="-윤고딕310" panose="02030504000101010101" pitchFamily="18" charset="-127"/>
                         <a:ea typeface="-윤고딕310" panose="02030504000101010101" pitchFamily="18" charset="-127"/>
                       </a:endParaRPr>
@@ -6443,7 +6808,7 @@
                   <a:tcPr marL="111605" marR="111605" marT="55802" marB="55802"/>
                 </a:tc>
               </a:tr>
-              <a:tr h="178502">
+              <a:tr h="519108">
                 <a:tc>
                   <a:txBody>
                     <a:bodyPr/>
@@ -6477,25 +6842,118 @@
                     <a:bodyPr/>
                     <a:lstStyle/>
                     <a:p>
-                      <a:pPr marL="0" indent="0" latinLnBrk="1">
+                      <a:pPr marL="0" indent="0" algn="ctr" latinLnBrk="1">
                         <a:buFont typeface="Arial" panose="020B0604020202020204" pitchFamily="34" charset="0"/>
                         <a:buNone/>
                       </a:pPr>
-                      <a:endParaRPr lang="ko-KR" altLang="en-US" sz="1400" dirty="0">
+                      <a:r>
+                        <a:rPr lang="en-US" altLang="ko-KR" sz="1200" dirty="0" smtClean="0">
+                          <a:latin typeface="-윤고딕310" panose="02030504000101010101" pitchFamily="18" charset="-127"/>
+                          <a:ea typeface="-윤고딕310" panose="02030504000101010101" pitchFamily="18" charset="-127"/>
+                        </a:rPr>
+                        <a:t>NPC</a:t>
+                      </a:r>
+                      <a:r>
+                        <a:rPr lang="en-US" altLang="ko-KR" sz="1200" baseline="0" dirty="0" smtClean="0">
+                          <a:latin typeface="-윤고딕310" panose="02030504000101010101" pitchFamily="18" charset="-127"/>
+                          <a:ea typeface="-윤고딕310" panose="02030504000101010101" pitchFamily="18" charset="-127"/>
+                        </a:rPr>
+                        <a:t> </a:t>
+                      </a:r>
+                      <a:r>
+                        <a:rPr lang="ko-KR" altLang="en-US" sz="1200" baseline="0" dirty="0" smtClean="0">
+                          <a:latin typeface="-윤고딕310" panose="02030504000101010101" pitchFamily="18" charset="-127"/>
+                          <a:ea typeface="-윤고딕310" panose="02030504000101010101" pitchFamily="18" charset="-127"/>
+                        </a:rPr>
+                        <a:t>객체와 인공지능</a:t>
+                      </a:r>
+                      <a:endParaRPr lang="ko-KR" altLang="en-US" sz="1200" dirty="0">
                         <a:latin typeface="-윤고딕310" panose="02030504000101010101" pitchFamily="18" charset="-127"/>
                         <a:ea typeface="-윤고딕310" panose="02030504000101010101" pitchFamily="18" charset="-127"/>
                       </a:endParaRPr>
                     </a:p>
                   </a:txBody>
-                  <a:tcPr marL="111605" marR="111605" marT="55802" marB="55802"/>
+                  <a:tcPr marL="111605" marR="111605" marT="55802" marB="55802" anchor="ctr"/>
                 </a:tc>
                 <a:tc>
                   <a:txBody>
                     <a:bodyPr/>
                     <a:lstStyle/>
                     <a:p>
-                      <a:pPr latinLnBrk="1"/>
-                      <a:endParaRPr lang="ko-KR" altLang="en-US" sz="1400" dirty="0">
+                      <a:pPr marL="171450" marR="0" indent="-171450" algn="l" defTabSz="914400" rtl="0" eaLnBrk="1" fontAlgn="auto" latinLnBrk="1" hangingPunct="1">
+                        <a:lnSpc>
+                          <a:spcPct val="100000"/>
+                        </a:lnSpc>
+                        <a:spcBef>
+                          <a:spcPts val="0"/>
+                        </a:spcBef>
+                        <a:spcAft>
+                          <a:spcPts val="0"/>
+                        </a:spcAft>
+                        <a:buClrTx/>
+                        <a:buSzTx/>
+                        <a:buFont typeface="Arial" panose="020B0604020202020204" pitchFamily="34" charset="0"/>
+                        <a:buChar char="•"/>
+                        <a:tabLst/>
+                        <a:defRPr/>
+                      </a:pPr>
+                      <a:r>
+                        <a:rPr lang="ko-KR" altLang="en-US" sz="1200" dirty="0" smtClean="0">
+                          <a:latin typeface="-윤고딕310" panose="02030504000101010101" pitchFamily="18" charset="-127"/>
+                          <a:ea typeface="-윤고딕310" panose="02030504000101010101" pitchFamily="18" charset="-127"/>
+                        </a:rPr>
+                        <a:t>적들은 시야가 있으며 플레이어를 발견하면 다가와 공격한다</a:t>
+                      </a:r>
+                      <a:r>
+                        <a:rPr lang="en-US" altLang="ko-KR" sz="1200" dirty="0" smtClean="0">
+                          <a:latin typeface="-윤고딕310" panose="02030504000101010101" pitchFamily="18" charset="-127"/>
+                          <a:ea typeface="-윤고딕310" panose="02030504000101010101" pitchFamily="18" charset="-127"/>
+                        </a:rPr>
+                        <a:t>. </a:t>
+                      </a:r>
+                      <a:r>
+                        <a:rPr lang="ko-KR" altLang="en-US" sz="1200" dirty="0" smtClean="0">
+                          <a:latin typeface="-윤고딕310" panose="02030504000101010101" pitchFamily="18" charset="-127"/>
+                          <a:ea typeface="-윤고딕310" panose="02030504000101010101" pitchFamily="18" charset="-127"/>
+                        </a:rPr>
+                        <a:t>적들은 대체로 단순하지만 일부 적은 까다로운 </a:t>
+                      </a:r>
+                      <a:r>
+                        <a:rPr lang="en-US" altLang="ko-KR" sz="1200" dirty="0" smtClean="0">
+                          <a:latin typeface="-윤고딕310" panose="02030504000101010101" pitchFamily="18" charset="-127"/>
+                          <a:ea typeface="-윤고딕310" panose="02030504000101010101" pitchFamily="18" charset="-127"/>
+                        </a:rPr>
+                        <a:t>(</a:t>
+                      </a:r>
+                      <a:r>
+                        <a:rPr lang="ko-KR" altLang="en-US" sz="1200" dirty="0" smtClean="0">
+                          <a:latin typeface="-윤고딕310" panose="02030504000101010101" pitchFamily="18" charset="-127"/>
+                          <a:ea typeface="-윤고딕310" panose="02030504000101010101" pitchFamily="18" charset="-127"/>
+                        </a:rPr>
+                        <a:t>하지만 반복적인</a:t>
+                      </a:r>
+                      <a:r>
+                        <a:rPr lang="en-US" altLang="ko-KR" sz="1200" dirty="0" smtClean="0">
+                          <a:latin typeface="-윤고딕310" panose="02030504000101010101" pitchFamily="18" charset="-127"/>
+                          <a:ea typeface="-윤고딕310" panose="02030504000101010101" pitchFamily="18" charset="-127"/>
+                        </a:rPr>
+                        <a:t>) </a:t>
+                      </a:r>
+                      <a:r>
+                        <a:rPr lang="ko-KR" altLang="en-US" sz="1200" dirty="0" smtClean="0">
+                          <a:latin typeface="-윤고딕310" panose="02030504000101010101" pitchFamily="18" charset="-127"/>
+                          <a:ea typeface="-윤고딕310" panose="02030504000101010101" pitchFamily="18" charset="-127"/>
+                        </a:rPr>
+                        <a:t>행동을 한다</a:t>
+                      </a:r>
+                      <a:r>
+                        <a:rPr lang="en-US" altLang="ko-KR" sz="1200" dirty="0" smtClean="0">
+                          <a:latin typeface="-윤고딕310" panose="02030504000101010101" pitchFamily="18" charset="-127"/>
+                          <a:ea typeface="-윤고딕310" panose="02030504000101010101" pitchFamily="18" charset="-127"/>
+                        </a:rPr>
+                        <a:t>.</a:t>
+                      </a:r>
+                      <a:endParaRPr lang="ko-KR" altLang="en-US" sz="1200" dirty="0" smtClean="0">
                         <a:latin typeface="-윤고딕310" panose="02030504000101010101" pitchFamily="18" charset="-127"/>
                         <a:ea typeface="-윤고딕310" panose="02030504000101010101" pitchFamily="18" charset="-127"/>
                       </a:endParaRPr>
@@ -6504,7 +6962,7 @@
                   <a:tcPr marL="111605" marR="111605" marT="55802" marB="55802"/>
                 </a:tc>
               </a:tr>
-              <a:tr h="178502">
+              <a:tr h="540006">
                 <a:tc>
                   <a:txBody>
                     <a:bodyPr/>
@@ -6538,48 +6996,25 @@
                     <a:bodyPr/>
                     <a:lstStyle/>
                     <a:p>
-                      <a:pPr marL="0" indent="0" latinLnBrk="1">
+                      <a:pPr marL="0" indent="0" algn="ctr" latinLnBrk="1">
                         <a:buFont typeface="Arial" panose="020B0604020202020204" pitchFamily="34" charset="0"/>
                         <a:buNone/>
                       </a:pPr>
-                      <a:endParaRPr lang="ko-KR" altLang="en-US" sz="1400" dirty="0">
-                        <a:latin typeface="-윤고딕310" panose="02030504000101010101" pitchFamily="18" charset="-127"/>
-                        <a:ea typeface="-윤고딕310" panose="02030504000101010101" pitchFamily="18" charset="-127"/>
-                      </a:endParaRPr>
-                    </a:p>
-                  </a:txBody>
-                  <a:tcPr marL="111605" marR="111605" marT="55802" marB="55802"/>
-                </a:tc>
-                <a:tc>
-                  <a:txBody>
-                    <a:bodyPr/>
-                    <a:lstStyle/>
-                    <a:p>
-                      <a:pPr latinLnBrk="1"/>
-                      <a:endParaRPr lang="ko-KR" altLang="en-US" sz="1400" dirty="0">
-                        <a:latin typeface="-윤고딕310" panose="02030504000101010101" pitchFamily="18" charset="-127"/>
-                        <a:ea typeface="-윤고딕310" panose="02030504000101010101" pitchFamily="18" charset="-127"/>
-                      </a:endParaRPr>
-                    </a:p>
-                  </a:txBody>
-                  <a:tcPr marL="111605" marR="111605" marT="55802" marB="55802"/>
-                </a:tc>
-              </a:tr>
-              <a:tr h="178502">
-                <a:tc>
-                  <a:txBody>
-                    <a:bodyPr/>
-                    <a:lstStyle/>
-                    <a:p>
-                      <a:pPr algn="ctr" latinLnBrk="1"/>
-                      <a:r>
-                        <a:rPr lang="en-US" altLang="ko-KR" sz="1900" dirty="0" smtClean="0">
-                          <a:latin typeface="-윤고딕310" panose="02030504000101010101" pitchFamily="18" charset="-127"/>
-                          <a:ea typeface="-윤고딕310" panose="02030504000101010101" pitchFamily="18" charset="-127"/>
-                        </a:rPr>
-                        <a:t>6</a:t>
-                      </a:r>
-                      <a:endParaRPr lang="ko-KR" altLang="en-US" sz="1900" dirty="0">
+                      <a:r>
+                        <a:rPr lang="ko-KR" altLang="en-US" sz="1200" dirty="0" smtClean="0">
+                          <a:latin typeface="-윤고딕310" panose="02030504000101010101" pitchFamily="18" charset="-127"/>
+                          <a:ea typeface="-윤고딕310" panose="02030504000101010101" pitchFamily="18" charset="-127"/>
+                        </a:rPr>
+                        <a:t>객체 상호 작용 </a:t>
+                      </a:r>
+                      <a:r>
+                        <a:rPr lang="en-US" altLang="ko-KR" sz="1200" dirty="0" smtClean="0">
+                          <a:latin typeface="-윤고딕310" panose="02030504000101010101" pitchFamily="18" charset="-127"/>
+                          <a:ea typeface="-윤고딕310" panose="02030504000101010101" pitchFamily="18" charset="-127"/>
+                        </a:rPr>
+                        <a:t>1</a:t>
+                      </a:r>
+                      <a:endParaRPr lang="ko-KR" altLang="en-US" sz="1200" dirty="0">
                         <a:latin typeface="-윤고딕310" panose="02030504000101010101" pitchFamily="18" charset="-127"/>
                         <a:ea typeface="-윤고딕310" panose="02030504000101010101" pitchFamily="18" charset="-127"/>
                       </a:endParaRPr>
@@ -6587,10 +7022,7 @@
                   </a:txBody>
                   <a:tcPr marL="111605" marR="111605" marT="55802" marB="55802" anchor="ctr">
                     <a:solidFill>
-                      <a:schemeClr val="accent1">
-                        <a:tint val="40000"/>
-                        <a:alpha val="35000"/>
-                      </a:schemeClr>
+                      <a:srgbClr val="FFF0E8"/>
                     </a:solidFill>
                   </a:tcPr>
                 </a:tc>
@@ -6599,275 +7031,76 @@
                     <a:bodyPr/>
                     <a:lstStyle/>
                     <a:p>
-                      <a:pPr marL="0" indent="0" latinLnBrk="1">
+                      <a:pPr marL="171450" indent="-171450" latinLnBrk="1">
                         <a:buFont typeface="Arial" panose="020B0604020202020204" pitchFamily="34" charset="0"/>
-                        <a:buNone/>
+                        <a:buChar char="•"/>
                       </a:pPr>
-                      <a:endParaRPr lang="ko-KR" altLang="en-US" sz="1400" dirty="0">
+                      <a:r>
+                        <a:rPr lang="ko-KR" altLang="en-US" sz="1200" dirty="0" smtClean="0">
+                          <a:latin typeface="-윤고딕310" panose="02030504000101010101" pitchFamily="18" charset="-127"/>
+                          <a:ea typeface="-윤고딕310" panose="02030504000101010101" pitchFamily="18" charset="-127"/>
+                        </a:rPr>
+                        <a:t>플레이어와 </a:t>
+                      </a:r>
+                      <a:r>
+                        <a:rPr lang="en-US" altLang="ko-KR" sz="1200" dirty="0" smtClean="0">
+                          <a:latin typeface="-윤고딕310" panose="02030504000101010101" pitchFamily="18" charset="-127"/>
+                          <a:ea typeface="-윤고딕310" panose="02030504000101010101" pitchFamily="18" charset="-127"/>
+                        </a:rPr>
+                        <a:t>NPC, NPC </a:t>
+                      </a:r>
+                      <a:r>
+                        <a:rPr lang="ko-KR" altLang="en-US" sz="1200" dirty="0" smtClean="0">
+                          <a:latin typeface="-윤고딕310" panose="02030504000101010101" pitchFamily="18" charset="-127"/>
+                          <a:ea typeface="-윤고딕310" panose="02030504000101010101" pitchFamily="18" charset="-127"/>
+                        </a:rPr>
+                        <a:t>와 </a:t>
+                      </a:r>
+                      <a:r>
+                        <a:rPr lang="en-US" altLang="ko-KR" sz="1200" dirty="0" smtClean="0">
+                          <a:latin typeface="-윤고딕310" panose="02030504000101010101" pitchFamily="18" charset="-127"/>
+                          <a:ea typeface="-윤고딕310" panose="02030504000101010101" pitchFamily="18" charset="-127"/>
+                        </a:rPr>
+                        <a:t>NPC </a:t>
+                      </a:r>
+                      <a:r>
+                        <a:rPr lang="ko-KR" altLang="en-US" sz="1200" dirty="0" smtClean="0">
+                          <a:latin typeface="-윤고딕310" panose="02030504000101010101" pitchFamily="18" charset="-127"/>
+                          <a:ea typeface="-윤고딕310" panose="02030504000101010101" pitchFamily="18" charset="-127"/>
+                        </a:rPr>
+                        <a:t>등등 객체들끼리의 상호 작용을</a:t>
+                      </a:r>
+                      <a:r>
+                        <a:rPr lang="ko-KR" altLang="en-US" sz="1200" baseline="0" dirty="0" smtClean="0">
+                          <a:latin typeface="-윤고딕310" panose="02030504000101010101" pitchFamily="18" charset="-127"/>
+                          <a:ea typeface="-윤고딕310" panose="02030504000101010101" pitchFamily="18" charset="-127"/>
+                        </a:rPr>
+                        <a:t> 구현한다</a:t>
+                      </a:r>
+                      <a:r>
+                        <a:rPr lang="en-US" altLang="ko-KR" sz="1200" baseline="0" dirty="0" smtClean="0">
+                          <a:latin typeface="-윤고딕310" panose="02030504000101010101" pitchFamily="18" charset="-127"/>
+                          <a:ea typeface="-윤고딕310" panose="02030504000101010101" pitchFamily="18" charset="-127"/>
+                        </a:rPr>
+                        <a:t>.</a:t>
+                      </a:r>
+                    </a:p>
+                    <a:p>
+                      <a:pPr marL="171450" indent="-171450" latinLnBrk="1">
+                        <a:buFont typeface="Arial" panose="020B0604020202020204" pitchFamily="34" charset="0"/>
+                        <a:buChar char="•"/>
+                      </a:pPr>
+                      <a:endParaRPr lang="ko-KR" altLang="en-US" sz="1200" dirty="0">
                         <a:latin typeface="-윤고딕310" panose="02030504000101010101" pitchFamily="18" charset="-127"/>
                         <a:ea typeface="-윤고딕310" panose="02030504000101010101" pitchFamily="18" charset="-127"/>
                       </a:endParaRPr>
                     </a:p>
                   </a:txBody>
-                  <a:tcPr marL="111605" marR="111605" marT="55802" marB="55802"/>
-                </a:tc>
-                <a:tc>
-                  <a:txBody>
-                    <a:bodyPr/>
-                    <a:lstStyle/>
-                    <a:p>
-                      <a:pPr latinLnBrk="1"/>
-                      <a:endParaRPr lang="ko-KR" altLang="en-US" sz="1400" dirty="0">
-                        <a:latin typeface="-윤고딕310" panose="02030504000101010101" pitchFamily="18" charset="-127"/>
-                        <a:ea typeface="-윤고딕310" panose="02030504000101010101" pitchFamily="18" charset="-127"/>
-                      </a:endParaRPr>
-                    </a:p>
-                  </a:txBody>
-                  <a:tcPr marL="111605" marR="111605" marT="55802" marB="55802"/>
-                </a:tc>
-              </a:tr>
-              <a:tr h="178502">
-                <a:tc>
-                  <a:txBody>
-                    <a:bodyPr/>
-                    <a:lstStyle/>
-                    <a:p>
-                      <a:pPr algn="ctr" latinLnBrk="1"/>
-                      <a:r>
-                        <a:rPr lang="en-US" altLang="ko-KR" sz="1900" dirty="0" smtClean="0">
-                          <a:latin typeface="-윤고딕310" panose="02030504000101010101" pitchFamily="18" charset="-127"/>
-                          <a:ea typeface="-윤고딕310" panose="02030504000101010101" pitchFamily="18" charset="-127"/>
-                        </a:rPr>
-                        <a:t>7</a:t>
-                      </a:r>
-                      <a:endParaRPr lang="ko-KR" altLang="en-US" sz="1900" dirty="0">
-                        <a:latin typeface="-윤고딕310" panose="02030504000101010101" pitchFamily="18" charset="-127"/>
-                        <a:ea typeface="-윤고딕310" panose="02030504000101010101" pitchFamily="18" charset="-127"/>
-                      </a:endParaRPr>
-                    </a:p>
-                  </a:txBody>
-                  <a:tcPr marL="111605" marR="111605" marT="55802" marB="55802" anchor="ctr">
+                  <a:tcPr marL="111605" marR="111605" marT="55802" marB="55802">
                     <a:solidFill>
-                      <a:schemeClr val="accent1">
-                        <a:tint val="40000"/>
-                        <a:alpha val="35000"/>
-                      </a:schemeClr>
+                      <a:srgbClr val="FFF0E8"/>
                     </a:solidFill>
                   </a:tcPr>
-                </a:tc>
-                <a:tc>
-                  <a:txBody>
-                    <a:bodyPr/>
-                    <a:lstStyle/>
-                    <a:p>
-                      <a:pPr marL="0" indent="0" latinLnBrk="1">
-                        <a:buFont typeface="Arial" panose="020B0604020202020204" pitchFamily="34" charset="0"/>
-                        <a:buNone/>
-                      </a:pPr>
-                      <a:endParaRPr lang="ko-KR" altLang="en-US" sz="1400" dirty="0">
-                        <a:latin typeface="-윤고딕310" panose="02030504000101010101" pitchFamily="18" charset="-127"/>
-                        <a:ea typeface="-윤고딕310" panose="02030504000101010101" pitchFamily="18" charset="-127"/>
-                      </a:endParaRPr>
-                    </a:p>
-                  </a:txBody>
-                  <a:tcPr marL="111605" marR="111605" marT="55802" marB="55802"/>
-                </a:tc>
-                <a:tc>
-                  <a:txBody>
-                    <a:bodyPr/>
-                    <a:lstStyle/>
-                    <a:p>
-                      <a:pPr latinLnBrk="1"/>
-                      <a:endParaRPr lang="ko-KR" altLang="en-US" sz="1400" dirty="0">
-                        <a:latin typeface="-윤고딕310" panose="02030504000101010101" pitchFamily="18" charset="-127"/>
-                        <a:ea typeface="-윤고딕310" panose="02030504000101010101" pitchFamily="18" charset="-127"/>
-                      </a:endParaRPr>
-                    </a:p>
-                  </a:txBody>
-                  <a:tcPr marL="111605" marR="111605" marT="55802" marB="55802"/>
-                </a:tc>
-              </a:tr>
-              <a:tr h="178502">
-                <a:tc>
-                  <a:txBody>
-                    <a:bodyPr/>
-                    <a:lstStyle/>
-                    <a:p>
-                      <a:pPr algn="ctr" latinLnBrk="1"/>
-                      <a:r>
-                        <a:rPr lang="en-US" altLang="ko-KR" sz="1900" dirty="0" smtClean="0">
-                          <a:latin typeface="-윤고딕310" panose="02030504000101010101" pitchFamily="18" charset="-127"/>
-                          <a:ea typeface="-윤고딕310" panose="02030504000101010101" pitchFamily="18" charset="-127"/>
-                        </a:rPr>
-                        <a:t>8</a:t>
-                      </a:r>
-                      <a:endParaRPr lang="ko-KR" altLang="en-US" sz="1900" dirty="0">
-                        <a:latin typeface="-윤고딕310" panose="02030504000101010101" pitchFamily="18" charset="-127"/>
-                        <a:ea typeface="-윤고딕310" panose="02030504000101010101" pitchFamily="18" charset="-127"/>
-                      </a:endParaRPr>
-                    </a:p>
-                  </a:txBody>
-                  <a:tcPr marL="111605" marR="111605" marT="55802" marB="55802" anchor="ctr">
-                    <a:solidFill>
-                      <a:schemeClr val="accent1">
-                        <a:tint val="40000"/>
-                        <a:alpha val="35000"/>
-                      </a:schemeClr>
-                    </a:solidFill>
-                  </a:tcPr>
-                </a:tc>
-                <a:tc>
-                  <a:txBody>
-                    <a:bodyPr/>
-                    <a:lstStyle/>
-                    <a:p>
-                      <a:pPr marL="0" indent="0" latinLnBrk="1">
-                        <a:buFont typeface="Arial" panose="020B0604020202020204" pitchFamily="34" charset="0"/>
-                        <a:buNone/>
-                      </a:pPr>
-                      <a:endParaRPr lang="ko-KR" altLang="en-US" sz="1400" dirty="0">
-                        <a:latin typeface="-윤고딕310" panose="02030504000101010101" pitchFamily="18" charset="-127"/>
-                        <a:ea typeface="-윤고딕310" panose="02030504000101010101" pitchFamily="18" charset="-127"/>
-                      </a:endParaRPr>
-                    </a:p>
-                  </a:txBody>
-                  <a:tcPr marL="111605" marR="111605" marT="55802" marB="55802"/>
-                </a:tc>
-                <a:tc>
-                  <a:txBody>
-                    <a:bodyPr/>
-                    <a:lstStyle/>
-                    <a:p>
-                      <a:pPr latinLnBrk="1"/>
-                      <a:endParaRPr lang="ko-KR" altLang="en-US" sz="1400" dirty="0">
-                        <a:latin typeface="-윤고딕310" panose="02030504000101010101" pitchFamily="18" charset="-127"/>
-                        <a:ea typeface="-윤고딕310" panose="02030504000101010101" pitchFamily="18" charset="-127"/>
-                      </a:endParaRPr>
-                    </a:p>
-                  </a:txBody>
-                  <a:tcPr marL="111605" marR="111605" marT="55802" marB="55802"/>
-                </a:tc>
-              </a:tr>
-              <a:tr h="178502">
-                <a:tc>
-                  <a:txBody>
-                    <a:bodyPr/>
-                    <a:lstStyle/>
-                    <a:p>
-                      <a:pPr algn="ctr" latinLnBrk="1"/>
-                      <a:r>
-                        <a:rPr lang="en-US" altLang="ko-KR" sz="1900" dirty="0" smtClean="0">
-                          <a:latin typeface="-윤고딕310" panose="02030504000101010101" pitchFamily="18" charset="-127"/>
-                          <a:ea typeface="-윤고딕310" panose="02030504000101010101" pitchFamily="18" charset="-127"/>
-                        </a:rPr>
-                        <a:t>9</a:t>
-                      </a:r>
-                      <a:endParaRPr lang="ko-KR" altLang="en-US" sz="1900" dirty="0">
-                        <a:latin typeface="-윤고딕310" panose="02030504000101010101" pitchFamily="18" charset="-127"/>
-                        <a:ea typeface="-윤고딕310" panose="02030504000101010101" pitchFamily="18" charset="-127"/>
-                      </a:endParaRPr>
-                    </a:p>
-                  </a:txBody>
-                  <a:tcPr marL="111605" marR="111605" marT="55802" marB="55802" anchor="ctr">
-                    <a:solidFill>
-                      <a:schemeClr val="accent1">
-                        <a:tint val="40000"/>
-                        <a:alpha val="35000"/>
-                      </a:schemeClr>
-                    </a:solidFill>
-                  </a:tcPr>
-                </a:tc>
-                <a:tc>
-                  <a:txBody>
-                    <a:bodyPr/>
-                    <a:lstStyle/>
-                    <a:p>
-                      <a:pPr marL="0" indent="0" latinLnBrk="1">
-                        <a:buFont typeface="Arial" panose="020B0604020202020204" pitchFamily="34" charset="0"/>
-                        <a:buNone/>
-                      </a:pPr>
-                      <a:endParaRPr lang="ko-KR" altLang="en-US" sz="1400" dirty="0">
-                        <a:latin typeface="-윤고딕310" panose="02030504000101010101" pitchFamily="18" charset="-127"/>
-                        <a:ea typeface="-윤고딕310" panose="02030504000101010101" pitchFamily="18" charset="-127"/>
-                      </a:endParaRPr>
-                    </a:p>
-                  </a:txBody>
-                  <a:tcPr marL="111605" marR="111605" marT="55802" marB="55802"/>
-                </a:tc>
-                <a:tc>
-                  <a:txBody>
-                    <a:bodyPr/>
-                    <a:lstStyle/>
-                    <a:p>
-                      <a:pPr latinLnBrk="1"/>
-                      <a:endParaRPr lang="ko-KR" altLang="en-US" sz="1400" dirty="0">
-                        <a:latin typeface="-윤고딕310" panose="02030504000101010101" pitchFamily="18" charset="-127"/>
-                        <a:ea typeface="-윤고딕310" panose="02030504000101010101" pitchFamily="18" charset="-127"/>
-                      </a:endParaRPr>
-                    </a:p>
-                  </a:txBody>
-                  <a:tcPr marL="111605" marR="111605" marT="55802" marB="55802"/>
-                </a:tc>
-              </a:tr>
-              <a:tr h="178502">
-                <a:tc>
-                  <a:txBody>
-                    <a:bodyPr/>
-                    <a:lstStyle/>
-                    <a:p>
-                      <a:pPr algn="ctr" latinLnBrk="1"/>
-                      <a:r>
-                        <a:rPr lang="en-US" altLang="ko-KR" sz="1900" dirty="0" smtClean="0">
-                          <a:latin typeface="-윤고딕310" panose="02030504000101010101" pitchFamily="18" charset="-127"/>
-                          <a:ea typeface="-윤고딕310" panose="02030504000101010101" pitchFamily="18" charset="-127"/>
-                        </a:rPr>
-                        <a:t>10</a:t>
-                      </a:r>
-                      <a:endParaRPr lang="ko-KR" altLang="en-US" sz="1900" dirty="0">
-                        <a:latin typeface="-윤고딕310" panose="02030504000101010101" pitchFamily="18" charset="-127"/>
-                        <a:ea typeface="-윤고딕310" panose="02030504000101010101" pitchFamily="18" charset="-127"/>
-                      </a:endParaRPr>
-                    </a:p>
-                  </a:txBody>
-                  <a:tcPr marL="111605" marR="111605" marT="55802" marB="55802" anchor="ctr">
-                    <a:solidFill>
-                      <a:schemeClr val="accent1">
-                        <a:tint val="40000"/>
-                        <a:alpha val="35000"/>
-                      </a:schemeClr>
-                    </a:solidFill>
-                  </a:tcPr>
-                </a:tc>
-                <a:tc>
-                  <a:txBody>
-                    <a:bodyPr/>
-                    <a:lstStyle/>
-                    <a:p>
-                      <a:pPr marL="0" indent="0" latinLnBrk="1">
-                        <a:buFont typeface="Arial" panose="020B0604020202020204" pitchFamily="34" charset="0"/>
-                        <a:buNone/>
-                      </a:pPr>
-                      <a:endParaRPr lang="ko-KR" altLang="en-US" sz="1400" dirty="0">
-                        <a:latin typeface="-윤고딕310" panose="02030504000101010101" pitchFamily="18" charset="-127"/>
-                        <a:ea typeface="-윤고딕310" panose="02030504000101010101" pitchFamily="18" charset="-127"/>
-                      </a:endParaRPr>
-                    </a:p>
-                  </a:txBody>
-                  <a:tcPr marL="111605" marR="111605" marT="55802" marB="55802"/>
-                </a:tc>
-                <a:tc>
-                  <a:txBody>
-                    <a:bodyPr/>
-                    <a:lstStyle/>
-                    <a:p>
-                      <a:pPr latinLnBrk="1"/>
-                      <a:endParaRPr lang="ko-KR" altLang="en-US" sz="1400" dirty="0">
-                        <a:latin typeface="-윤고딕310" panose="02030504000101010101" pitchFamily="18" charset="-127"/>
-                        <a:ea typeface="-윤고딕310" panose="02030504000101010101" pitchFamily="18" charset="-127"/>
-                      </a:endParaRPr>
-                    </a:p>
-                  </a:txBody>
-                  <a:tcPr marL="111605" marR="111605" marT="55802" marB="55802"/>
                 </a:tc>
               </a:tr>
             </a:tbl>
@@ -6896,7 +7129,7 @@
           <a:p>
             <a:fld id="{E63BED42-B56B-487C-A576-F8E55AE26EFB}" type="datetime1">
               <a:rPr lang="ko-KR" altLang="en-US" smtClean="0"/>
-              <a:t>2017-10-16</a:t>
+              <a:t>2017-10-17</a:t>
             </a:fld>
             <a:endParaRPr lang="ko-KR" altLang="en-US"/>
           </a:p>
@@ -6951,7 +7184,7 @@
           <a:lstStyle/>
           <a:p>
             <a:r>
-              <a:rPr lang="en-US" altLang="ko-KR" smtClean="0">
+              <a:rPr lang="en-US" altLang="ko-KR" dirty="0" smtClean="0">
                 <a:solidFill>
                   <a:srgbClr val="C00000"/>
                 </a:solidFill>
@@ -6961,7 +7194,7 @@
               <a:t>2D </a:t>
             </a:r>
             <a:r>
-              <a:rPr lang="ko-KR" altLang="en-US" smtClean="0">
+              <a:rPr lang="ko-KR" altLang="en-US" dirty="0" smtClean="0">
                 <a:solidFill>
                   <a:srgbClr val="C00000"/>
                 </a:solidFill>
@@ -6970,7 +7203,7 @@
               </a:rPr>
               <a:t>게임 프로그래밍</a:t>
             </a:r>
-            <a:endParaRPr lang="ko-KR" altLang="en-US">
+            <a:endParaRPr lang="ko-KR" altLang="en-US" dirty="0">
               <a:solidFill>
                 <a:srgbClr val="C00000"/>
               </a:solidFill>
@@ -7001,6 +7234,1161 @@
 </file>
 
 <file path=ppt/slides/slide11.xml><?xml version="1.0" encoding="utf-8"?>
+<p:sld xmlns:a="http://schemas.openxmlformats.org/drawingml/2006/main" xmlns:r="http://schemas.openxmlformats.org/officeDocument/2006/relationships" xmlns:p="http://schemas.openxmlformats.org/presentationml/2006/main">
+  <p:cSld>
+    <p:spTree>
+      <p:nvGrpSpPr>
+        <p:cNvPr id="1" name=""/>
+        <p:cNvGrpSpPr/>
+        <p:nvPr/>
+      </p:nvGrpSpPr>
+      <p:grpSpPr>
+        <a:xfrm>
+          <a:off x="0" y="0"/>
+          <a:ext cx="0" cy="0"/>
+          <a:chOff x="0" y="0"/>
+          <a:chExt cx="0" cy="0"/>
+        </a:xfrm>
+      </p:grpSpPr>
+      <p:sp>
+        <p:nvSpPr>
+          <p:cNvPr id="2" name="제목 1"/>
+          <p:cNvSpPr>
+            <a:spLocks noGrp="1"/>
+          </p:cNvSpPr>
+          <p:nvPr>
+            <p:ph type="title"/>
+          </p:nvPr>
+        </p:nvSpPr>
+        <p:spPr>
+          <a:xfrm>
+            <a:off x="1115616" y="980728"/>
+            <a:ext cx="6965245" cy="1202485"/>
+          </a:xfrm>
+        </p:spPr>
+        <p:txBody>
+          <a:bodyPr anchor="t"/>
+          <a:lstStyle/>
+          <a:p>
+            <a:r>
+              <a:rPr lang="ko-KR" altLang="en-US" dirty="0" smtClean="0">
+                <a:latin typeface="-윤고딕320" panose="02030504000101010101" pitchFamily="18" charset="-127"/>
+                <a:ea typeface="-윤고딕320" panose="02030504000101010101" pitchFamily="18" charset="-127"/>
+              </a:rPr>
+              <a:t>예상 개발 일정</a:t>
+            </a:r>
+            <a:endParaRPr lang="ko-KR" altLang="en-US" dirty="0">
+              <a:latin typeface="-윤고딕320" panose="02030504000101010101" pitchFamily="18" charset="-127"/>
+              <a:ea typeface="-윤고딕320" panose="02030504000101010101" pitchFamily="18" charset="-127"/>
+            </a:endParaRPr>
+          </a:p>
+        </p:txBody>
+      </p:sp>
+      <p:graphicFrame>
+        <p:nvGraphicFramePr>
+          <p:cNvPr id="7" name="내용 개체 틀 6"/>
+          <p:cNvGraphicFramePr>
+            <a:graphicFrameLocks noGrp="1"/>
+          </p:cNvGraphicFramePr>
+          <p:nvPr>
+            <p:ph idx="1"/>
+            <p:extLst>
+              <p:ext uri="{D42A27DB-BD31-4B8C-83A1-F6EECF244321}">
+                <p14:modId xmlns:p14="http://schemas.microsoft.com/office/powerpoint/2010/main" val="2089294043"/>
+              </p:ext>
+            </p:extLst>
+          </p:nvPr>
+        </p:nvGraphicFramePr>
+        <p:xfrm>
+          <a:off x="827584" y="1844822"/>
+          <a:ext cx="7490416" cy="3903570"/>
+        </p:xfrm>
+        <a:graphic>
+          <a:graphicData uri="http://schemas.openxmlformats.org/drawingml/2006/table">
+            <a:tbl>
+              <a:tblPr firstRow="1" bandRow="1">
+                <a:effectLst>
+                  <a:innerShdw blurRad="228600">
+                    <a:prstClr val="black">
+                      <a:alpha val="98000"/>
+                    </a:prstClr>
+                  </a:innerShdw>
+                </a:effectLst>
+                <a:tableStyleId>{5C22544A-7EE6-4342-B048-85BDC9FD1C3A}</a:tableStyleId>
+              </a:tblPr>
+              <a:tblGrid>
+                <a:gridCol w="706497"/>
+                <a:gridCol w="1695591"/>
+                <a:gridCol w="5088328"/>
+              </a:tblGrid>
+              <a:tr h="446867">
+                <a:tc>
+                  <a:txBody>
+                    <a:bodyPr/>
+                    <a:lstStyle/>
+                    <a:p>
+                      <a:pPr algn="ctr" latinLnBrk="1"/>
+                      <a:r>
+                        <a:rPr lang="ko-KR" altLang="en-US" sz="2000" b="0" dirty="0" smtClean="0">
+                          <a:latin typeface="-윤고딕320" panose="02030504000101010101" pitchFamily="18" charset="-127"/>
+                          <a:ea typeface="-윤고딕320" panose="02030504000101010101" pitchFamily="18" charset="-127"/>
+                        </a:rPr>
+                        <a:t>주차</a:t>
+                      </a:r>
+                      <a:endParaRPr lang="ko-KR" altLang="en-US" sz="2000" b="0" dirty="0">
+                        <a:latin typeface="-윤고딕320" panose="02030504000101010101" pitchFamily="18" charset="-127"/>
+                        <a:ea typeface="-윤고딕320" panose="02030504000101010101" pitchFamily="18" charset="-127"/>
+                      </a:endParaRPr>
+                    </a:p>
+                  </a:txBody>
+                  <a:tcPr marL="111605" marR="111605" marT="55802" marB="55802" anchor="ctr">
+                    <a:solidFill>
+                      <a:schemeClr val="accent1">
+                        <a:tint val="40000"/>
+                        <a:alpha val="35000"/>
+                      </a:schemeClr>
+                    </a:solidFill>
+                  </a:tcPr>
+                </a:tc>
+                <a:tc>
+                  <a:txBody>
+                    <a:bodyPr/>
+                    <a:lstStyle/>
+                    <a:p>
+                      <a:pPr algn="ctr" latinLnBrk="1"/>
+                      <a:r>
+                        <a:rPr lang="ko-KR" altLang="en-US" sz="2000" b="0" dirty="0" smtClean="0">
+                          <a:latin typeface="-윤고딕320" panose="02030504000101010101" pitchFamily="18" charset="-127"/>
+                          <a:ea typeface="-윤고딕320" panose="02030504000101010101" pitchFamily="18" charset="-127"/>
+                        </a:rPr>
+                        <a:t>주제</a:t>
+                      </a:r>
+                      <a:endParaRPr lang="ko-KR" altLang="en-US" sz="2000" b="0" dirty="0">
+                        <a:latin typeface="-윤고딕320" panose="02030504000101010101" pitchFamily="18" charset="-127"/>
+                        <a:ea typeface="-윤고딕320" panose="02030504000101010101" pitchFamily="18" charset="-127"/>
+                      </a:endParaRPr>
+                    </a:p>
+                  </a:txBody>
+                  <a:tcPr marL="111605" marR="111605" marT="55802" marB="55802" anchor="ctr"/>
+                </a:tc>
+                <a:tc>
+                  <a:txBody>
+                    <a:bodyPr/>
+                    <a:lstStyle/>
+                    <a:p>
+                      <a:pPr algn="ctr" latinLnBrk="1"/>
+                      <a:r>
+                        <a:rPr lang="ko-KR" altLang="en-US" sz="2000" b="0" dirty="0" smtClean="0">
+                          <a:latin typeface="-윤고딕320" panose="02030504000101010101" pitchFamily="18" charset="-127"/>
+                          <a:ea typeface="-윤고딕320" panose="02030504000101010101" pitchFamily="18" charset="-127"/>
+                        </a:rPr>
+                        <a:t>상세</a:t>
+                      </a:r>
+                      <a:endParaRPr lang="ko-KR" altLang="en-US" sz="2000" b="0" dirty="0">
+                        <a:latin typeface="-윤고딕320" panose="02030504000101010101" pitchFamily="18" charset="-127"/>
+                        <a:ea typeface="-윤고딕320" panose="02030504000101010101" pitchFamily="18" charset="-127"/>
+                      </a:endParaRPr>
+                    </a:p>
+                  </a:txBody>
+                  <a:tcPr marL="111605" marR="111605" marT="55802" marB="55802" anchor="ctr"/>
+                </a:tc>
+              </a:tr>
+              <a:tr h="688313">
+                <a:tc>
+                  <a:txBody>
+                    <a:bodyPr/>
+                    <a:lstStyle/>
+                    <a:p>
+                      <a:pPr algn="ctr" latinLnBrk="1"/>
+                      <a:r>
+                        <a:rPr lang="en-US" altLang="ko-KR" sz="1900" dirty="0" smtClean="0">
+                          <a:latin typeface="-윤고딕310" panose="02030504000101010101" pitchFamily="18" charset="-127"/>
+                          <a:ea typeface="-윤고딕310" panose="02030504000101010101" pitchFamily="18" charset="-127"/>
+                        </a:rPr>
+                        <a:t>6</a:t>
+                      </a:r>
+                      <a:endParaRPr lang="ko-KR" altLang="en-US" sz="1900" dirty="0">
+                        <a:latin typeface="-윤고딕310" panose="02030504000101010101" pitchFamily="18" charset="-127"/>
+                        <a:ea typeface="-윤고딕310" panose="02030504000101010101" pitchFamily="18" charset="-127"/>
+                      </a:endParaRPr>
+                    </a:p>
+                  </a:txBody>
+                  <a:tcPr marL="111605" marR="111605" marT="55802" marB="55802" anchor="ctr">
+                    <a:solidFill>
+                      <a:schemeClr val="accent1">
+                        <a:tint val="40000"/>
+                        <a:alpha val="35000"/>
+                      </a:schemeClr>
+                    </a:solidFill>
+                  </a:tcPr>
+                </a:tc>
+                <a:tc rowSpan="2">
+                  <a:txBody>
+                    <a:bodyPr/>
+                    <a:lstStyle/>
+                    <a:p>
+                      <a:pPr marL="0" marR="0" indent="0" algn="ctr" defTabSz="914400" rtl="0" eaLnBrk="1" fontAlgn="auto" latinLnBrk="1" hangingPunct="1">
+                        <a:lnSpc>
+                          <a:spcPct val="100000"/>
+                        </a:lnSpc>
+                        <a:spcBef>
+                          <a:spcPts val="0"/>
+                        </a:spcBef>
+                        <a:spcAft>
+                          <a:spcPts val="0"/>
+                        </a:spcAft>
+                        <a:buClrTx/>
+                        <a:buSzTx/>
+                        <a:buFont typeface="Arial" panose="020B0604020202020204" pitchFamily="34" charset="0"/>
+                        <a:buNone/>
+                        <a:tabLst/>
+                        <a:defRPr/>
+                      </a:pPr>
+                      <a:r>
+                        <a:rPr lang="ko-KR" altLang="en-US" sz="1200" dirty="0" smtClean="0">
+                          <a:latin typeface="-윤고딕310" panose="02030504000101010101" pitchFamily="18" charset="-127"/>
+                          <a:ea typeface="-윤고딕310" panose="02030504000101010101" pitchFamily="18" charset="-127"/>
+                        </a:rPr>
+                        <a:t>지형 생성</a:t>
+                      </a:r>
+                      <a:r>
+                        <a:rPr lang="en-US" altLang="ko-KR" sz="1200" dirty="0" smtClean="0">
+                          <a:latin typeface="-윤고딕310" panose="02030504000101010101" pitchFamily="18" charset="-127"/>
+                          <a:ea typeface="-윤고딕310" panose="02030504000101010101" pitchFamily="18" charset="-127"/>
+                        </a:rPr>
+                        <a:t>,</a:t>
+                      </a:r>
+                      <a:r>
+                        <a:rPr lang="en-US" altLang="ko-KR" sz="1200" baseline="0" dirty="0" smtClean="0">
+                          <a:latin typeface="-윤고딕310" panose="02030504000101010101" pitchFamily="18" charset="-127"/>
+                          <a:ea typeface="-윤고딕310" panose="02030504000101010101" pitchFamily="18" charset="-127"/>
+                        </a:rPr>
+                        <a:t> </a:t>
+                      </a:r>
+                      <a:r>
+                        <a:rPr lang="ko-KR" altLang="en-US" sz="1200" baseline="0" dirty="0" smtClean="0">
+                          <a:latin typeface="-윤고딕310" panose="02030504000101010101" pitchFamily="18" charset="-127"/>
+                          <a:ea typeface="-윤고딕310" panose="02030504000101010101" pitchFamily="18" charset="-127"/>
+                        </a:rPr>
+                        <a:t>맵 분할</a:t>
+                      </a:r>
+                      <a:endParaRPr lang="en-US" altLang="ko-KR" sz="1200" baseline="0" dirty="0" smtClean="0">
+                        <a:latin typeface="-윤고딕310" panose="02030504000101010101" pitchFamily="18" charset="-127"/>
+                        <a:ea typeface="-윤고딕310" panose="02030504000101010101" pitchFamily="18" charset="-127"/>
+                      </a:endParaRPr>
+                    </a:p>
+                    <a:p>
+                      <a:pPr marL="0" marR="0" indent="0" algn="ctr" defTabSz="914400" rtl="0" eaLnBrk="1" fontAlgn="auto" latinLnBrk="1" hangingPunct="1">
+                        <a:lnSpc>
+                          <a:spcPct val="100000"/>
+                        </a:lnSpc>
+                        <a:spcBef>
+                          <a:spcPts val="0"/>
+                        </a:spcBef>
+                        <a:spcAft>
+                          <a:spcPts val="0"/>
+                        </a:spcAft>
+                        <a:buClrTx/>
+                        <a:buSzTx/>
+                        <a:buFont typeface="Arial" panose="020B0604020202020204" pitchFamily="34" charset="0"/>
+                        <a:buNone/>
+                        <a:tabLst/>
+                        <a:defRPr/>
+                      </a:pPr>
+                      <a:r>
+                        <a:rPr lang="ko-KR" altLang="en-US" sz="1200" baseline="0" dirty="0" smtClean="0">
+                          <a:latin typeface="-윤고딕310" panose="02030504000101010101" pitchFamily="18" charset="-127"/>
+                          <a:ea typeface="-윤고딕310" panose="02030504000101010101" pitchFamily="18" charset="-127"/>
+                        </a:rPr>
+                        <a:t>테마 작업</a:t>
+                      </a:r>
+                      <a:endParaRPr lang="ko-KR" altLang="en-US" sz="1200" dirty="0" smtClean="0">
+                        <a:latin typeface="-윤고딕310" panose="02030504000101010101" pitchFamily="18" charset="-127"/>
+                        <a:ea typeface="-윤고딕310" panose="02030504000101010101" pitchFamily="18" charset="-127"/>
+                      </a:endParaRPr>
+                    </a:p>
+                  </a:txBody>
+                  <a:tcPr marL="111605" marR="111605" marT="55802" marB="55802" anchor="ctr">
+                    <a:solidFill>
+                      <a:srgbClr val="FFF0E8"/>
+                    </a:solidFill>
+                  </a:tcPr>
+                </a:tc>
+                <a:tc rowSpan="2">
+                  <a:txBody>
+                    <a:bodyPr/>
+                    <a:lstStyle/>
+                    <a:p>
+                      <a:pPr marL="171450" indent="-171450" latinLnBrk="1">
+                        <a:buFont typeface="Arial" panose="020B0604020202020204" pitchFamily="34" charset="0"/>
+                        <a:buChar char="•"/>
+                      </a:pPr>
+                      <a:r>
+                        <a:rPr lang="ko-KR" altLang="en-US" sz="1200" dirty="0" smtClean="0">
+                          <a:latin typeface="-윤고딕310" panose="02030504000101010101" pitchFamily="18" charset="-127"/>
+                          <a:ea typeface="-윤고딕310" panose="02030504000101010101" pitchFamily="18" charset="-127"/>
+                        </a:rPr>
+                        <a:t>사실상 본 게임을 구현하는 것이므로 심혈을 기울인다</a:t>
+                      </a:r>
+                      <a:r>
+                        <a:rPr lang="en-US" altLang="ko-KR" sz="1200" dirty="0" smtClean="0">
+                          <a:latin typeface="-윤고딕310" panose="02030504000101010101" pitchFamily="18" charset="-127"/>
+                          <a:ea typeface="-윤고딕310" panose="02030504000101010101" pitchFamily="18" charset="-127"/>
+                        </a:rPr>
+                        <a:t>. </a:t>
+                      </a:r>
+                      <a:r>
+                        <a:rPr lang="ko-KR" altLang="en-US" sz="1200" dirty="0" smtClean="0">
+                          <a:latin typeface="-윤고딕310" panose="02030504000101010101" pitchFamily="18" charset="-127"/>
+                          <a:ea typeface="-윤고딕310" panose="02030504000101010101" pitchFamily="18" charset="-127"/>
+                        </a:rPr>
+                        <a:t>각 테마에 맞는 리소스를 할당한다</a:t>
+                      </a:r>
+                      <a:r>
+                        <a:rPr lang="en-US" altLang="ko-KR" sz="1200" dirty="0" smtClean="0">
+                          <a:latin typeface="-윤고딕310" panose="02030504000101010101" pitchFamily="18" charset="-127"/>
+                          <a:ea typeface="-윤고딕310" panose="02030504000101010101" pitchFamily="18" charset="-127"/>
+                        </a:rPr>
+                        <a:t>.</a:t>
+                      </a:r>
+                    </a:p>
+                    <a:p>
+                      <a:pPr marL="171450" marR="0" indent="-171450" algn="l" defTabSz="914400" rtl="0" eaLnBrk="1" fontAlgn="auto" latinLnBrk="1" hangingPunct="1">
+                        <a:lnSpc>
+                          <a:spcPct val="100000"/>
+                        </a:lnSpc>
+                        <a:spcBef>
+                          <a:spcPts val="0"/>
+                        </a:spcBef>
+                        <a:spcAft>
+                          <a:spcPts val="0"/>
+                        </a:spcAft>
+                        <a:buClrTx/>
+                        <a:buSzTx/>
+                        <a:buFont typeface="Arial" panose="020B0604020202020204" pitchFamily="34" charset="0"/>
+                        <a:buChar char="•"/>
+                        <a:tabLst/>
+                        <a:defRPr/>
+                      </a:pPr>
+                      <a:r>
+                        <a:rPr lang="ko-KR" altLang="en-US" sz="1200" dirty="0" smtClean="0">
+                          <a:latin typeface="-윤고딕310" panose="02030504000101010101" pitchFamily="18" charset="-127"/>
+                          <a:ea typeface="-윤고딕310" panose="02030504000101010101" pitchFamily="18" charset="-127"/>
+                        </a:rPr>
+                        <a:t>스테이지가 끝날 때의 효과를 정한다</a:t>
+                      </a:r>
+                      <a:r>
+                        <a:rPr lang="en-US" altLang="ko-KR" sz="1200" dirty="0" smtClean="0">
+                          <a:latin typeface="-윤고딕310" panose="02030504000101010101" pitchFamily="18" charset="-127"/>
+                          <a:ea typeface="-윤고딕310" panose="02030504000101010101" pitchFamily="18" charset="-127"/>
+                        </a:rPr>
+                        <a:t>. </a:t>
+                      </a:r>
+                      <a:r>
+                        <a:rPr lang="ko-KR" altLang="en-US" sz="1200" dirty="0" smtClean="0">
+                          <a:latin typeface="-윤고딕310" panose="02030504000101010101" pitchFamily="18" charset="-127"/>
+                          <a:ea typeface="-윤고딕310" panose="02030504000101010101" pitchFamily="18" charset="-127"/>
+                        </a:rPr>
+                        <a:t>넘어갈 때는 스테이지 결과 요약이 표시된다</a:t>
+                      </a:r>
+                      <a:r>
+                        <a:rPr lang="en-US" altLang="ko-KR" sz="1200" dirty="0" smtClean="0">
+                          <a:latin typeface="-윤고딕310" panose="02030504000101010101" pitchFamily="18" charset="-127"/>
+                          <a:ea typeface="-윤고딕310" panose="02030504000101010101" pitchFamily="18" charset="-127"/>
+                        </a:rPr>
+                        <a:t>. </a:t>
+                      </a:r>
+                      <a:r>
+                        <a:rPr lang="ko-KR" altLang="en-US" sz="1200" dirty="0" smtClean="0">
+                          <a:latin typeface="-윤고딕310" panose="02030504000101010101" pitchFamily="18" charset="-127"/>
+                          <a:ea typeface="-윤고딕310" panose="02030504000101010101" pitchFamily="18" charset="-127"/>
+                        </a:rPr>
+                        <a:t>이때 </a:t>
+                      </a:r>
+                      <a:r>
+                        <a:rPr lang="en-US" altLang="ko-KR" sz="1200" dirty="0" smtClean="0">
+                          <a:latin typeface="-윤고딕310" panose="02030504000101010101" pitchFamily="18" charset="-127"/>
+                          <a:ea typeface="-윤고딕310" panose="02030504000101010101" pitchFamily="18" charset="-127"/>
+                        </a:rPr>
+                        <a:t>UI </a:t>
+                      </a:r>
+                      <a:r>
+                        <a:rPr lang="ko-KR" altLang="en-US" sz="1200" dirty="0" smtClean="0">
+                          <a:latin typeface="-윤고딕310" panose="02030504000101010101" pitchFamily="18" charset="-127"/>
+                          <a:ea typeface="-윤고딕310" panose="02030504000101010101" pitchFamily="18" charset="-127"/>
+                        </a:rPr>
+                        <a:t>에 가려진 사이에</a:t>
+                      </a:r>
+                      <a:r>
+                        <a:rPr lang="ko-KR" altLang="en-US" sz="1200" baseline="0" dirty="0" smtClean="0">
+                          <a:latin typeface="-윤고딕310" panose="02030504000101010101" pitchFamily="18" charset="-127"/>
+                          <a:ea typeface="-윤고딕310" panose="02030504000101010101" pitchFamily="18" charset="-127"/>
+                        </a:rPr>
+                        <a:t> </a:t>
+                      </a:r>
+                      <a:r>
+                        <a:rPr lang="ko-KR" altLang="en-US" sz="1200" dirty="0" smtClean="0">
+                          <a:latin typeface="-윤고딕310" panose="02030504000101010101" pitchFamily="18" charset="-127"/>
+                          <a:ea typeface="-윤고딕310" panose="02030504000101010101" pitchFamily="18" charset="-127"/>
+                        </a:rPr>
+                        <a:t>지형이 자동 생성된다</a:t>
+                      </a:r>
+                      <a:r>
+                        <a:rPr lang="en-US" altLang="ko-KR" sz="1200" dirty="0" smtClean="0">
+                          <a:latin typeface="-윤고딕310" panose="02030504000101010101" pitchFamily="18" charset="-127"/>
+                          <a:ea typeface="-윤고딕310" panose="02030504000101010101" pitchFamily="18" charset="-127"/>
+                        </a:rPr>
+                        <a:t>. </a:t>
+                      </a:r>
+                      <a:r>
+                        <a:rPr lang="ko-KR" altLang="en-US" sz="1200" dirty="0" smtClean="0">
+                          <a:latin typeface="-윤고딕310" panose="02030504000101010101" pitchFamily="18" charset="-127"/>
+                          <a:ea typeface="-윤고딕310" panose="02030504000101010101" pitchFamily="18" charset="-127"/>
+                        </a:rPr>
+                        <a:t>물론 맵은 미리 정해져 있다</a:t>
+                      </a:r>
+                      <a:r>
+                        <a:rPr lang="en-US" altLang="ko-KR" sz="1200" dirty="0" smtClean="0">
+                          <a:latin typeface="-윤고딕310" panose="02030504000101010101" pitchFamily="18" charset="-127"/>
+                          <a:ea typeface="-윤고딕310" panose="02030504000101010101" pitchFamily="18" charset="-127"/>
+                        </a:rPr>
+                        <a:t>. </a:t>
+                      </a:r>
+                    </a:p>
+                    <a:p>
+                      <a:pPr marL="171450" indent="-171450" latinLnBrk="1">
+                        <a:buFont typeface="Arial" panose="020B0604020202020204" pitchFamily="34" charset="0"/>
+                        <a:buChar char="•"/>
+                      </a:pPr>
+                      <a:r>
+                        <a:rPr lang="ko-KR" altLang="en-US" sz="1200" dirty="0" smtClean="0">
+                          <a:latin typeface="-윤고딕310" panose="02030504000101010101" pitchFamily="18" charset="-127"/>
+                          <a:ea typeface="-윤고딕310" panose="02030504000101010101" pitchFamily="18" charset="-127"/>
+                        </a:rPr>
+                        <a:t>한 테마가 끝나면 간단한 컷 신이 있어 스토리를 알 수 있다</a:t>
+                      </a:r>
+                      <a:r>
+                        <a:rPr lang="en-US" altLang="ko-KR" sz="1200" dirty="0" smtClean="0">
+                          <a:latin typeface="-윤고딕310" panose="02030504000101010101" pitchFamily="18" charset="-127"/>
+                          <a:ea typeface="-윤고딕310" panose="02030504000101010101" pitchFamily="18" charset="-127"/>
+                        </a:rPr>
+                        <a:t>. </a:t>
+                      </a:r>
+                      <a:r>
+                        <a:rPr lang="ko-KR" altLang="en-US" sz="1200" dirty="0" smtClean="0">
+                          <a:latin typeface="-윤고딕310" panose="02030504000101010101" pitchFamily="18" charset="-127"/>
+                          <a:ea typeface="-윤고딕310" panose="02030504000101010101" pitchFamily="18" charset="-127"/>
+                        </a:rPr>
+                        <a:t>그림을 그려서 표현하는 게 아니라 동굴 이야기처럼 게임 화면에 대화 창을 띄운다</a:t>
+                      </a:r>
+                      <a:r>
+                        <a:rPr lang="en-US" altLang="ko-KR" sz="1200" dirty="0" smtClean="0">
+                          <a:latin typeface="-윤고딕310" panose="02030504000101010101" pitchFamily="18" charset="-127"/>
+                          <a:ea typeface="-윤고딕310" panose="02030504000101010101" pitchFamily="18" charset="-127"/>
+                        </a:rPr>
+                        <a:t>.</a:t>
+                      </a:r>
+                      <a:endParaRPr lang="ko-KR" altLang="en-US" sz="1200" dirty="0">
+                        <a:latin typeface="-윤고딕310" panose="02030504000101010101" pitchFamily="18" charset="-127"/>
+                        <a:ea typeface="-윤고딕310" panose="02030504000101010101" pitchFamily="18" charset="-127"/>
+                      </a:endParaRPr>
+                    </a:p>
+                  </a:txBody>
+                  <a:tcPr marL="111605" marR="111605" marT="55802" marB="55802">
+                    <a:solidFill>
+                      <a:srgbClr val="FFF0E8"/>
+                    </a:solidFill>
+                  </a:tcPr>
+                </a:tc>
+              </a:tr>
+              <a:tr h="688313">
+                <a:tc>
+                  <a:txBody>
+                    <a:bodyPr/>
+                    <a:lstStyle/>
+                    <a:p>
+                      <a:pPr algn="ctr" latinLnBrk="1"/>
+                      <a:r>
+                        <a:rPr lang="en-US" altLang="ko-KR" sz="1900" dirty="0" smtClean="0">
+                          <a:latin typeface="-윤고딕310" panose="02030504000101010101" pitchFamily="18" charset="-127"/>
+                          <a:ea typeface="-윤고딕310" panose="02030504000101010101" pitchFamily="18" charset="-127"/>
+                        </a:rPr>
+                        <a:t>7</a:t>
+                      </a:r>
+                      <a:endParaRPr lang="ko-KR" altLang="en-US" sz="1900" dirty="0">
+                        <a:latin typeface="-윤고딕310" panose="02030504000101010101" pitchFamily="18" charset="-127"/>
+                        <a:ea typeface="-윤고딕310" panose="02030504000101010101" pitchFamily="18" charset="-127"/>
+                      </a:endParaRPr>
+                    </a:p>
+                  </a:txBody>
+                  <a:tcPr marL="111605" marR="111605" marT="55802" marB="55802" anchor="ctr">
+                    <a:solidFill>
+                      <a:schemeClr val="accent1">
+                        <a:tint val="40000"/>
+                        <a:alpha val="35000"/>
+                      </a:schemeClr>
+                    </a:solidFill>
+                  </a:tcPr>
+                </a:tc>
+                <a:tc vMerge="1">
+                  <a:txBody>
+                    <a:bodyPr/>
+                    <a:lstStyle/>
+                    <a:p>
+                      <a:pPr marL="0" indent="0" algn="ctr" latinLnBrk="1">
+                        <a:buFont typeface="Arial" panose="020B0604020202020204" pitchFamily="34" charset="0"/>
+                        <a:buNone/>
+                      </a:pPr>
+                      <a:endParaRPr lang="ko-KR" altLang="en-US" sz="1200" dirty="0">
+                        <a:latin typeface="-윤고딕310" panose="02030504000101010101" pitchFamily="18" charset="-127"/>
+                        <a:ea typeface="-윤고딕310" panose="02030504000101010101" pitchFamily="18" charset="-127"/>
+                      </a:endParaRPr>
+                    </a:p>
+                  </a:txBody>
+                  <a:tcPr marL="111605" marR="111605" marT="55802" marB="55802" anchor="ctr"/>
+                </a:tc>
+                <a:tc vMerge="1">
+                  <a:txBody>
+                    <a:bodyPr/>
+                    <a:lstStyle/>
+                    <a:p>
+                      <a:pPr latinLnBrk="1"/>
+                      <a:endParaRPr lang="ko-KR" altLang="en-US" sz="1200" dirty="0">
+                        <a:latin typeface="-윤고딕310" panose="02030504000101010101" pitchFamily="18" charset="-127"/>
+                        <a:ea typeface="-윤고딕310" panose="02030504000101010101" pitchFamily="18" charset="-127"/>
+                      </a:endParaRPr>
+                    </a:p>
+                  </a:txBody>
+                  <a:tcPr marL="111605" marR="111605" marT="55802" marB="55802"/>
+                </a:tc>
+              </a:tr>
+              <a:tr h="688313">
+                <a:tc>
+                  <a:txBody>
+                    <a:bodyPr/>
+                    <a:lstStyle/>
+                    <a:p>
+                      <a:pPr algn="ctr" latinLnBrk="1"/>
+                      <a:r>
+                        <a:rPr lang="en-US" altLang="ko-KR" sz="1900" dirty="0" smtClean="0">
+                          <a:latin typeface="-윤고딕310" panose="02030504000101010101" pitchFamily="18" charset="-127"/>
+                          <a:ea typeface="-윤고딕310" panose="02030504000101010101" pitchFamily="18" charset="-127"/>
+                        </a:rPr>
+                        <a:t>8</a:t>
+                      </a:r>
+                      <a:endParaRPr lang="ko-KR" altLang="en-US" sz="1900" dirty="0">
+                        <a:latin typeface="-윤고딕310" panose="02030504000101010101" pitchFamily="18" charset="-127"/>
+                        <a:ea typeface="-윤고딕310" panose="02030504000101010101" pitchFamily="18" charset="-127"/>
+                      </a:endParaRPr>
+                    </a:p>
+                  </a:txBody>
+                  <a:tcPr marL="111605" marR="111605" marT="55802" marB="55802" anchor="ctr">
+                    <a:solidFill>
+                      <a:schemeClr val="accent1">
+                        <a:tint val="40000"/>
+                        <a:alpha val="35000"/>
+                      </a:schemeClr>
+                    </a:solidFill>
+                  </a:tcPr>
+                </a:tc>
+                <a:tc>
+                  <a:txBody>
+                    <a:bodyPr/>
+                    <a:lstStyle/>
+                    <a:p>
+                      <a:pPr marL="0" marR="0" indent="0" algn="ctr" defTabSz="914400" rtl="0" eaLnBrk="1" fontAlgn="auto" latinLnBrk="1" hangingPunct="1">
+                        <a:lnSpc>
+                          <a:spcPct val="100000"/>
+                        </a:lnSpc>
+                        <a:spcBef>
+                          <a:spcPts val="0"/>
+                        </a:spcBef>
+                        <a:spcAft>
+                          <a:spcPts val="0"/>
+                        </a:spcAft>
+                        <a:buClrTx/>
+                        <a:buSzTx/>
+                        <a:buFont typeface="Arial" panose="020B0604020202020204" pitchFamily="34" charset="0"/>
+                        <a:buNone/>
+                        <a:tabLst/>
+                        <a:defRPr/>
+                      </a:pPr>
+                      <a:r>
+                        <a:rPr lang="ko-KR" altLang="en-US" sz="1200" dirty="0" smtClean="0">
+                          <a:latin typeface="-윤고딕310" panose="02030504000101010101" pitchFamily="18" charset="-127"/>
+                          <a:ea typeface="-윤고딕310" panose="02030504000101010101" pitchFamily="18" charset="-127"/>
+                        </a:rPr>
+                        <a:t>객체 상호 작용 </a:t>
+                      </a:r>
+                      <a:r>
+                        <a:rPr lang="en-US" altLang="ko-KR" sz="1200" dirty="0" smtClean="0">
+                          <a:latin typeface="-윤고딕310" panose="02030504000101010101" pitchFamily="18" charset="-127"/>
+                          <a:ea typeface="-윤고딕310" panose="02030504000101010101" pitchFamily="18" charset="-127"/>
+                        </a:rPr>
+                        <a:t>2,</a:t>
+                      </a:r>
+                    </a:p>
+                    <a:p>
+                      <a:pPr marL="0" marR="0" indent="0" algn="ctr" defTabSz="914400" rtl="0" eaLnBrk="1" fontAlgn="auto" latinLnBrk="1" hangingPunct="1">
+                        <a:lnSpc>
+                          <a:spcPct val="100000"/>
+                        </a:lnSpc>
+                        <a:spcBef>
+                          <a:spcPts val="0"/>
+                        </a:spcBef>
+                        <a:spcAft>
+                          <a:spcPts val="0"/>
+                        </a:spcAft>
+                        <a:buClrTx/>
+                        <a:buSzTx/>
+                        <a:buFont typeface="Arial" panose="020B0604020202020204" pitchFamily="34" charset="0"/>
+                        <a:buNone/>
+                        <a:tabLst/>
+                        <a:defRPr/>
+                      </a:pPr>
+                      <a:r>
+                        <a:rPr lang="ko-KR" altLang="en-US" sz="1200" dirty="0" smtClean="0">
+                          <a:latin typeface="-윤고딕310" panose="02030504000101010101" pitchFamily="18" charset="-127"/>
+                          <a:ea typeface="-윤고딕310" panose="02030504000101010101" pitchFamily="18" charset="-127"/>
+                        </a:rPr>
+                        <a:t>인터페이스 </a:t>
+                      </a:r>
+                      <a:r>
+                        <a:rPr lang="en-US" altLang="ko-KR" sz="1200" dirty="0" smtClean="0">
+                          <a:latin typeface="-윤고딕310" panose="02030504000101010101" pitchFamily="18" charset="-127"/>
+                          <a:ea typeface="-윤고딕310" panose="02030504000101010101" pitchFamily="18" charset="-127"/>
+                        </a:rPr>
+                        <a:t>1</a:t>
+                      </a:r>
+                      <a:endParaRPr lang="ko-KR" altLang="en-US" sz="1200" dirty="0" smtClean="0">
+                        <a:latin typeface="-윤고딕310" panose="02030504000101010101" pitchFamily="18" charset="-127"/>
+                        <a:ea typeface="-윤고딕310" panose="02030504000101010101" pitchFamily="18" charset="-127"/>
+                      </a:endParaRPr>
+                    </a:p>
+                  </a:txBody>
+                  <a:tcPr marL="111605" marR="111605" marT="55802" marB="55802" anchor="ctr"/>
+                </a:tc>
+                <a:tc>
+                  <a:txBody>
+                    <a:bodyPr/>
+                    <a:lstStyle/>
+                    <a:p>
+                      <a:pPr marL="171450" indent="-171450" latinLnBrk="1">
+                        <a:buFont typeface="Arial" panose="020B0604020202020204" pitchFamily="34" charset="0"/>
+                        <a:buChar char="•"/>
+                      </a:pPr>
+                      <a:r>
+                        <a:rPr lang="ko-KR" altLang="en-US" sz="1200" dirty="0" smtClean="0">
+                          <a:latin typeface="-윤고딕310" panose="02030504000101010101" pitchFamily="18" charset="-127"/>
+                          <a:ea typeface="-윤고딕310" panose="02030504000101010101" pitchFamily="18" charset="-127"/>
+                        </a:rPr>
+                        <a:t>객체 사이의 상호 작용</a:t>
+                      </a:r>
+                      <a:r>
+                        <a:rPr lang="en-US" altLang="ko-KR" sz="1200" dirty="0" smtClean="0">
+                          <a:latin typeface="-윤고딕310" panose="02030504000101010101" pitchFamily="18" charset="-127"/>
+                          <a:ea typeface="-윤고딕310" panose="02030504000101010101" pitchFamily="18" charset="-127"/>
+                        </a:rPr>
+                        <a:t>, </a:t>
+                      </a:r>
+                      <a:r>
+                        <a:rPr lang="ko-KR" altLang="en-US" sz="1200" dirty="0" smtClean="0">
+                          <a:latin typeface="-윤고딕310" panose="02030504000101010101" pitchFamily="18" charset="-127"/>
+                          <a:ea typeface="-윤고딕310" panose="02030504000101010101" pitchFamily="18" charset="-127"/>
+                        </a:rPr>
+                        <a:t>컷 신이나 적 출현 등 다양한 이벤트를 구현한다</a:t>
+                      </a:r>
+                      <a:r>
+                        <a:rPr lang="en-US" altLang="ko-KR" sz="1200" dirty="0" smtClean="0">
+                          <a:latin typeface="-윤고딕310" panose="02030504000101010101" pitchFamily="18" charset="-127"/>
+                          <a:ea typeface="-윤고딕310" panose="02030504000101010101" pitchFamily="18" charset="-127"/>
+                        </a:rPr>
+                        <a:t>. </a:t>
+                      </a:r>
+                      <a:br>
+                        <a:rPr lang="en-US" altLang="ko-KR" sz="1200" dirty="0" smtClean="0">
+                          <a:latin typeface="-윤고딕310" panose="02030504000101010101" pitchFamily="18" charset="-127"/>
+                          <a:ea typeface="-윤고딕310" panose="02030504000101010101" pitchFamily="18" charset="-127"/>
+                        </a:rPr>
+                      </a:br>
+                      <a:r>
+                        <a:rPr lang="ko-KR" altLang="en-US" sz="1200" dirty="0" smtClean="0">
+                          <a:latin typeface="-윤고딕310" panose="02030504000101010101" pitchFamily="18" charset="-127"/>
+                          <a:ea typeface="-윤고딕310" panose="02030504000101010101" pitchFamily="18" charset="-127"/>
+                        </a:rPr>
+                        <a:t>최대한 간단한 방향으로 구현한다</a:t>
+                      </a:r>
+                      <a:r>
+                        <a:rPr lang="en-US" altLang="ko-KR" sz="1200" dirty="0" smtClean="0">
+                          <a:latin typeface="-윤고딕310" panose="02030504000101010101" pitchFamily="18" charset="-127"/>
+                          <a:ea typeface="-윤고딕310" panose="02030504000101010101" pitchFamily="18" charset="-127"/>
+                        </a:rPr>
+                        <a:t>.</a:t>
+                      </a:r>
+                      <a:endParaRPr lang="en-US" altLang="ko-KR" sz="1200" baseline="0" dirty="0" smtClean="0">
+                        <a:latin typeface="-윤고딕310" panose="02030504000101010101" pitchFamily="18" charset="-127"/>
+                        <a:ea typeface="-윤고딕310" panose="02030504000101010101" pitchFamily="18" charset="-127"/>
+                      </a:endParaRPr>
+                    </a:p>
+                    <a:p>
+                      <a:pPr marL="171450" indent="-171450" latinLnBrk="1">
+                        <a:buFont typeface="Arial" panose="020B0604020202020204" pitchFamily="34" charset="0"/>
+                        <a:buChar char="•"/>
+                      </a:pPr>
+                      <a:r>
+                        <a:rPr lang="ko-KR" altLang="en-US" sz="1200" dirty="0" smtClean="0">
+                          <a:latin typeface="-윤고딕310" panose="02030504000101010101" pitchFamily="18" charset="-127"/>
+                          <a:ea typeface="-윤고딕310" panose="02030504000101010101" pitchFamily="18" charset="-127"/>
+                        </a:rPr>
+                        <a:t>스테이지 요약 페이지</a:t>
+                      </a:r>
+                      <a:r>
+                        <a:rPr lang="en-US" altLang="ko-KR" sz="1200" dirty="0" smtClean="0">
+                          <a:latin typeface="-윤고딕310" panose="02030504000101010101" pitchFamily="18" charset="-127"/>
+                          <a:ea typeface="-윤고딕310" panose="02030504000101010101" pitchFamily="18" charset="-127"/>
+                        </a:rPr>
+                        <a:t>, </a:t>
+                      </a:r>
+                      <a:r>
+                        <a:rPr lang="ko-KR" altLang="en-US" sz="1200" dirty="0" smtClean="0">
+                          <a:latin typeface="-윤고딕310" panose="02030504000101010101" pitchFamily="18" charset="-127"/>
+                          <a:ea typeface="-윤고딕310" panose="02030504000101010101" pitchFamily="18" charset="-127"/>
+                        </a:rPr>
+                        <a:t>메인 화면을 구현한다</a:t>
+                      </a:r>
+                      <a:r>
+                        <a:rPr lang="en-US" altLang="ko-KR" sz="1200" dirty="0" smtClean="0">
+                          <a:latin typeface="-윤고딕310" panose="02030504000101010101" pitchFamily="18" charset="-127"/>
+                          <a:ea typeface="-윤고딕310" panose="02030504000101010101" pitchFamily="18" charset="-127"/>
+                        </a:rPr>
+                        <a:t>.</a:t>
+                      </a:r>
+                      <a:endParaRPr lang="ko-KR" altLang="en-US" sz="1200" dirty="0">
+                        <a:latin typeface="-윤고딕310" panose="02030504000101010101" pitchFamily="18" charset="-127"/>
+                        <a:ea typeface="-윤고딕310" panose="02030504000101010101" pitchFamily="18" charset="-127"/>
+                      </a:endParaRPr>
+                    </a:p>
+                  </a:txBody>
+                  <a:tcPr marL="111605" marR="111605" marT="55802" marB="55802"/>
+                </a:tc>
+              </a:tr>
+              <a:tr h="688313">
+                <a:tc>
+                  <a:txBody>
+                    <a:bodyPr/>
+                    <a:lstStyle/>
+                    <a:p>
+                      <a:pPr algn="ctr" latinLnBrk="1"/>
+                      <a:r>
+                        <a:rPr lang="en-US" altLang="ko-KR" sz="1900" dirty="0" smtClean="0">
+                          <a:latin typeface="-윤고딕310" panose="02030504000101010101" pitchFamily="18" charset="-127"/>
+                          <a:ea typeface="-윤고딕310" panose="02030504000101010101" pitchFamily="18" charset="-127"/>
+                        </a:rPr>
+                        <a:t>9</a:t>
+                      </a:r>
+                      <a:endParaRPr lang="ko-KR" altLang="en-US" sz="1900" dirty="0">
+                        <a:latin typeface="-윤고딕310" panose="02030504000101010101" pitchFamily="18" charset="-127"/>
+                        <a:ea typeface="-윤고딕310" panose="02030504000101010101" pitchFamily="18" charset="-127"/>
+                      </a:endParaRPr>
+                    </a:p>
+                  </a:txBody>
+                  <a:tcPr marL="111605" marR="111605" marT="55802" marB="55802" anchor="ctr">
+                    <a:solidFill>
+                      <a:schemeClr val="accent1">
+                        <a:tint val="40000"/>
+                        <a:alpha val="35000"/>
+                      </a:schemeClr>
+                    </a:solidFill>
+                  </a:tcPr>
+                </a:tc>
+                <a:tc>
+                  <a:txBody>
+                    <a:bodyPr/>
+                    <a:lstStyle/>
+                    <a:p>
+                      <a:pPr marL="0" marR="0" indent="0" algn="ctr" defTabSz="914400" rtl="0" eaLnBrk="1" fontAlgn="auto" latinLnBrk="1" hangingPunct="1">
+                        <a:lnSpc>
+                          <a:spcPct val="100000"/>
+                        </a:lnSpc>
+                        <a:spcBef>
+                          <a:spcPts val="0"/>
+                        </a:spcBef>
+                        <a:spcAft>
+                          <a:spcPts val="0"/>
+                        </a:spcAft>
+                        <a:buClrTx/>
+                        <a:buSzTx/>
+                        <a:buFont typeface="Arial" panose="020B0604020202020204" pitchFamily="34" charset="0"/>
+                        <a:buNone/>
+                        <a:tabLst/>
+                        <a:defRPr/>
+                      </a:pPr>
+                      <a:r>
+                        <a:rPr lang="ko-KR" altLang="en-US" sz="1200" dirty="0" smtClean="0">
+                          <a:latin typeface="-윤고딕310" panose="02030504000101010101" pitchFamily="18" charset="-127"/>
+                          <a:ea typeface="-윤고딕310" panose="02030504000101010101" pitchFamily="18" charset="-127"/>
+                        </a:rPr>
+                        <a:t>인터페이스 </a:t>
+                      </a:r>
+                      <a:r>
+                        <a:rPr lang="en-US" altLang="ko-KR" sz="1200" dirty="0" smtClean="0">
+                          <a:latin typeface="-윤고딕310" panose="02030504000101010101" pitchFamily="18" charset="-127"/>
+                          <a:ea typeface="-윤고딕310" panose="02030504000101010101" pitchFamily="18" charset="-127"/>
+                        </a:rPr>
+                        <a:t>2</a:t>
+                      </a:r>
+                      <a:endParaRPr lang="ko-KR" altLang="en-US" sz="1200" dirty="0" smtClean="0">
+                        <a:latin typeface="-윤고딕310" panose="02030504000101010101" pitchFamily="18" charset="-127"/>
+                        <a:ea typeface="-윤고딕310" panose="02030504000101010101" pitchFamily="18" charset="-127"/>
+                      </a:endParaRPr>
+                    </a:p>
+                  </a:txBody>
+                  <a:tcPr marL="111605" marR="111605" marT="55802" marB="55802" anchor="ctr"/>
+                </a:tc>
+                <a:tc>
+                  <a:txBody>
+                    <a:bodyPr/>
+                    <a:lstStyle/>
+                    <a:p>
+                      <a:pPr marL="171450" indent="-171450" latinLnBrk="1">
+                        <a:buFont typeface="Arial" panose="020B0604020202020204" pitchFamily="34" charset="0"/>
+                        <a:buChar char="•"/>
+                      </a:pPr>
+                      <a:r>
+                        <a:rPr lang="ko-KR" altLang="en-US" sz="1200" dirty="0" smtClean="0">
+                          <a:latin typeface="-윤고딕310" panose="02030504000101010101" pitchFamily="18" charset="-127"/>
+                          <a:ea typeface="-윤고딕310" panose="02030504000101010101" pitchFamily="18" charset="-127"/>
+                        </a:rPr>
+                        <a:t>메인 화면</a:t>
+                      </a:r>
+                      <a:r>
+                        <a:rPr lang="en-US" altLang="ko-KR" sz="1200" dirty="0" smtClean="0">
+                          <a:latin typeface="-윤고딕310" panose="02030504000101010101" pitchFamily="18" charset="-127"/>
+                          <a:ea typeface="-윤고딕310" panose="02030504000101010101" pitchFamily="18" charset="-127"/>
+                        </a:rPr>
+                        <a:t>, </a:t>
+                      </a:r>
+                      <a:r>
+                        <a:rPr lang="ko-KR" altLang="en-US" sz="1200" dirty="0" smtClean="0">
+                          <a:latin typeface="-윤고딕310" panose="02030504000101010101" pitchFamily="18" charset="-127"/>
+                          <a:ea typeface="-윤고딕310" panose="02030504000101010101" pitchFamily="18" charset="-127"/>
+                        </a:rPr>
+                        <a:t>보조 게임 메뉴를 추가한다</a:t>
+                      </a:r>
+                      <a:r>
+                        <a:rPr lang="en-US" altLang="ko-KR" sz="1200" dirty="0" smtClean="0">
+                          <a:latin typeface="-윤고딕310" panose="02030504000101010101" pitchFamily="18" charset="-127"/>
+                          <a:ea typeface="-윤고딕310" panose="02030504000101010101" pitchFamily="18" charset="-127"/>
+                        </a:rPr>
+                        <a:t>.</a:t>
+                      </a:r>
+                    </a:p>
+                    <a:p>
+                      <a:pPr marL="171450" indent="-171450" latinLnBrk="1">
+                        <a:buFont typeface="Arial" panose="020B0604020202020204" pitchFamily="34" charset="0"/>
+                        <a:buChar char="•"/>
+                      </a:pPr>
+                      <a:r>
+                        <a:rPr lang="ko-KR" altLang="en-US" sz="1200" dirty="0" smtClean="0">
+                          <a:latin typeface="-윤고딕310" panose="02030504000101010101" pitchFamily="18" charset="-127"/>
+                          <a:ea typeface="-윤고딕310" panose="02030504000101010101" pitchFamily="18" charset="-127"/>
+                        </a:rPr>
+                        <a:t>게임 진행 중에</a:t>
+                      </a:r>
+                      <a:r>
+                        <a:rPr lang="ko-KR" altLang="en-US" sz="1200" baseline="0" dirty="0" smtClean="0">
+                          <a:latin typeface="-윤고딕310" panose="02030504000101010101" pitchFamily="18" charset="-127"/>
+                          <a:ea typeface="-윤고딕310" panose="02030504000101010101" pitchFamily="18" charset="-127"/>
+                        </a:rPr>
+                        <a:t> 직접 표시되는 </a:t>
+                      </a:r>
+                      <a:r>
+                        <a:rPr lang="ko-KR" altLang="en-US" sz="1200" dirty="0" smtClean="0">
+                          <a:latin typeface="-윤고딕310" panose="02030504000101010101" pitchFamily="18" charset="-127"/>
+                          <a:ea typeface="-윤고딕310" panose="02030504000101010101" pitchFamily="18" charset="-127"/>
+                        </a:rPr>
+                        <a:t>인터페이스는 점수</a:t>
+                      </a:r>
+                      <a:r>
+                        <a:rPr lang="en-US" altLang="ko-KR" sz="1200" dirty="0" smtClean="0">
+                          <a:latin typeface="-윤고딕310" panose="02030504000101010101" pitchFamily="18" charset="-127"/>
+                          <a:ea typeface="-윤고딕310" panose="02030504000101010101" pitchFamily="18" charset="-127"/>
+                        </a:rPr>
+                        <a:t>, </a:t>
+                      </a:r>
+                      <a:r>
+                        <a:rPr lang="ko-KR" altLang="en-US" sz="1200" dirty="0" smtClean="0">
+                          <a:latin typeface="-윤고딕310" panose="02030504000101010101" pitchFamily="18" charset="-127"/>
+                          <a:ea typeface="-윤고딕310" panose="02030504000101010101" pitchFamily="18" charset="-127"/>
+                        </a:rPr>
+                        <a:t>체력 게이지</a:t>
+                      </a:r>
+                      <a:r>
+                        <a:rPr lang="en-US" altLang="ko-KR" sz="1200" dirty="0" smtClean="0">
+                          <a:latin typeface="-윤고딕310" panose="02030504000101010101" pitchFamily="18" charset="-127"/>
+                          <a:ea typeface="-윤고딕310" panose="02030504000101010101" pitchFamily="18" charset="-127"/>
+                        </a:rPr>
+                        <a:t>,</a:t>
+                      </a:r>
+                      <a:r>
+                        <a:rPr lang="en-US" altLang="ko-KR" sz="1200" baseline="0" dirty="0" smtClean="0">
+                          <a:latin typeface="-윤고딕310" panose="02030504000101010101" pitchFamily="18" charset="-127"/>
+                          <a:ea typeface="-윤고딕310" panose="02030504000101010101" pitchFamily="18" charset="-127"/>
+                        </a:rPr>
+                        <a:t> </a:t>
+                      </a:r>
+                      <a:r>
+                        <a:rPr lang="ko-KR" altLang="en-US" sz="1200" baseline="0" dirty="0" smtClean="0">
+                          <a:latin typeface="-윤고딕310" panose="02030504000101010101" pitchFamily="18" charset="-127"/>
+                          <a:ea typeface="-윤고딕310" panose="02030504000101010101" pitchFamily="18" charset="-127"/>
+                        </a:rPr>
+                        <a:t>그리고 들고 있는 장비 표시가 전부이다</a:t>
+                      </a:r>
+                      <a:r>
+                        <a:rPr lang="en-US" altLang="ko-KR" sz="1200" baseline="0" dirty="0" smtClean="0">
+                          <a:latin typeface="-윤고딕310" panose="02030504000101010101" pitchFamily="18" charset="-127"/>
+                          <a:ea typeface="-윤고딕310" panose="02030504000101010101" pitchFamily="18" charset="-127"/>
+                        </a:rPr>
+                        <a:t>.</a:t>
+                      </a:r>
+                      <a:endParaRPr lang="ko-KR" altLang="en-US" sz="1200" dirty="0">
+                        <a:latin typeface="-윤고딕310" panose="02030504000101010101" pitchFamily="18" charset="-127"/>
+                        <a:ea typeface="-윤고딕310" panose="02030504000101010101" pitchFamily="18" charset="-127"/>
+                      </a:endParaRPr>
+                    </a:p>
+                  </a:txBody>
+                  <a:tcPr marL="111605" marR="111605" marT="55802" marB="55802"/>
+                </a:tc>
+              </a:tr>
+              <a:tr h="688313">
+                <a:tc>
+                  <a:txBody>
+                    <a:bodyPr/>
+                    <a:lstStyle/>
+                    <a:p>
+                      <a:pPr algn="ctr" latinLnBrk="1"/>
+                      <a:r>
+                        <a:rPr lang="en-US" altLang="ko-KR" sz="1900" dirty="0" smtClean="0">
+                          <a:latin typeface="-윤고딕310" panose="02030504000101010101" pitchFamily="18" charset="-127"/>
+                          <a:ea typeface="-윤고딕310" panose="02030504000101010101" pitchFamily="18" charset="-127"/>
+                        </a:rPr>
+                        <a:t>10</a:t>
+                      </a:r>
+                      <a:endParaRPr lang="ko-KR" altLang="en-US" sz="1900" dirty="0">
+                        <a:latin typeface="-윤고딕310" panose="02030504000101010101" pitchFamily="18" charset="-127"/>
+                        <a:ea typeface="-윤고딕310" panose="02030504000101010101" pitchFamily="18" charset="-127"/>
+                      </a:endParaRPr>
+                    </a:p>
+                  </a:txBody>
+                  <a:tcPr marL="111605" marR="111605" marT="55802" marB="55802" anchor="ctr">
+                    <a:solidFill>
+                      <a:schemeClr val="accent1">
+                        <a:tint val="40000"/>
+                        <a:alpha val="35000"/>
+                      </a:schemeClr>
+                    </a:solidFill>
+                  </a:tcPr>
+                </a:tc>
+                <a:tc>
+                  <a:txBody>
+                    <a:bodyPr/>
+                    <a:lstStyle/>
+                    <a:p>
+                      <a:pPr marL="0" marR="0" indent="0" algn="ctr" defTabSz="914400" rtl="0" eaLnBrk="1" fontAlgn="auto" latinLnBrk="1" hangingPunct="1">
+                        <a:lnSpc>
+                          <a:spcPct val="100000"/>
+                        </a:lnSpc>
+                        <a:spcBef>
+                          <a:spcPts val="0"/>
+                        </a:spcBef>
+                        <a:spcAft>
+                          <a:spcPts val="0"/>
+                        </a:spcAft>
+                        <a:buClrTx/>
+                        <a:buSzTx/>
+                        <a:buFont typeface="Arial" panose="020B0604020202020204" pitchFamily="34" charset="0"/>
+                        <a:buNone/>
+                        <a:tabLst/>
+                        <a:defRPr/>
+                      </a:pPr>
+                      <a:r>
+                        <a:rPr lang="ko-KR" altLang="en-US" sz="1200" dirty="0" smtClean="0">
+                          <a:latin typeface="-윤고딕310" panose="02030504000101010101" pitchFamily="18" charset="-127"/>
+                          <a:ea typeface="-윤고딕310" panose="02030504000101010101" pitchFamily="18" charset="-127"/>
+                        </a:rPr>
+                        <a:t>게임 릴리즈</a:t>
+                      </a:r>
+                      <a:r>
+                        <a:rPr lang="en-US" altLang="ko-KR" sz="1200" dirty="0" smtClean="0">
+                          <a:latin typeface="-윤고딕310" panose="02030504000101010101" pitchFamily="18" charset="-127"/>
+                          <a:ea typeface="-윤고딕310" panose="02030504000101010101" pitchFamily="18" charset="-127"/>
+                        </a:rPr>
+                        <a:t>, </a:t>
+                      </a:r>
+                      <a:r>
+                        <a:rPr lang="ko-KR" altLang="en-US" sz="1200" dirty="0" smtClean="0">
+                          <a:latin typeface="-윤고딕310" panose="02030504000101010101" pitchFamily="18" charset="-127"/>
+                          <a:ea typeface="-윤고딕310" panose="02030504000101010101" pitchFamily="18" charset="-127"/>
+                        </a:rPr>
+                        <a:t>테스트</a:t>
+                      </a:r>
+                    </a:p>
+                  </a:txBody>
+                  <a:tcPr marL="111605" marR="111605" marT="55802" marB="55802" anchor="ctr"/>
+                </a:tc>
+                <a:tc>
+                  <a:txBody>
+                    <a:bodyPr/>
+                    <a:lstStyle/>
+                    <a:p>
+                      <a:pPr latinLnBrk="1"/>
+                      <a:r>
+                        <a:rPr lang="ko-KR" altLang="en-US" sz="1200" dirty="0" smtClean="0">
+                          <a:latin typeface="-윤고딕310" panose="02030504000101010101" pitchFamily="18" charset="-127"/>
+                          <a:ea typeface="-윤고딕310" panose="02030504000101010101" pitchFamily="18" charset="-127"/>
+                        </a:rPr>
+                        <a:t>마무리</a:t>
+                      </a:r>
+                      <a:endParaRPr lang="ko-KR" altLang="en-US" sz="1200" dirty="0">
+                        <a:latin typeface="-윤고딕310" panose="02030504000101010101" pitchFamily="18" charset="-127"/>
+                        <a:ea typeface="-윤고딕310" panose="02030504000101010101" pitchFamily="18" charset="-127"/>
+                      </a:endParaRPr>
+                    </a:p>
+                  </a:txBody>
+                  <a:tcPr marL="111605" marR="111605" marT="55802" marB="55802"/>
+                </a:tc>
+              </a:tr>
+            </a:tbl>
+          </a:graphicData>
+        </a:graphic>
+      </p:graphicFrame>
+      <p:sp>
+        <p:nvSpPr>
+          <p:cNvPr id="4" name="날짜 개체 틀 3"/>
+          <p:cNvSpPr>
+            <a:spLocks noGrp="1"/>
+          </p:cNvSpPr>
+          <p:nvPr>
+            <p:ph type="dt" sz="half" idx="10"/>
+          </p:nvPr>
+        </p:nvSpPr>
+        <p:spPr>
+          <a:xfrm>
+            <a:off x="6452730" y="5877272"/>
+            <a:ext cx="1213821" cy="365125"/>
+          </a:xfrm>
+        </p:spPr>
+        <p:txBody>
+          <a:bodyPr/>
+          <a:lstStyle/>
+          <a:p>
+            <a:fld id="{E63BED42-B56B-487C-A576-F8E55AE26EFB}" type="datetime1">
+              <a:rPr lang="ko-KR" altLang="en-US" smtClean="0"/>
+              <a:t>2017-10-17</a:t>
+            </a:fld>
+            <a:endParaRPr lang="ko-KR" altLang="en-US"/>
+          </a:p>
+        </p:txBody>
+      </p:sp>
+      <p:sp>
+        <p:nvSpPr>
+          <p:cNvPr id="5" name="슬라이드 번호 개체 틀 4"/>
+          <p:cNvSpPr>
+            <a:spLocks noGrp="1"/>
+          </p:cNvSpPr>
+          <p:nvPr>
+            <p:ph type="sldNum" sz="quarter" idx="12"/>
+          </p:nvPr>
+        </p:nvSpPr>
+        <p:spPr>
+          <a:xfrm>
+            <a:off x="7668344" y="5877272"/>
+            <a:ext cx="554023" cy="365125"/>
+          </a:xfrm>
+        </p:spPr>
+        <p:txBody>
+          <a:bodyPr/>
+          <a:lstStyle/>
+          <a:p>
+            <a:fld id="{8ED71C24-08E4-4AF3-BCF3-1A22B934883E}" type="slidenum">
+              <a:rPr lang="ko-KR" altLang="en-US" smtClean="0"/>
+              <a:t>11</a:t>
+            </a:fld>
+            <a:endParaRPr lang="ko-KR" altLang="en-US"/>
+          </a:p>
+        </p:txBody>
+      </p:sp>
+      <p:sp>
+        <p:nvSpPr>
+          <p:cNvPr id="6" name="바닥글 개체 틀 5"/>
+          <p:cNvSpPr>
+            <a:spLocks noGrp="1"/>
+          </p:cNvSpPr>
+          <p:nvPr>
+            <p:ph type="ftr" sz="quarter" idx="11"/>
+          </p:nvPr>
+        </p:nvSpPr>
+        <p:spPr>
+          <a:xfrm>
+            <a:off x="912543" y="5877272"/>
+            <a:ext cx="5540188" cy="365125"/>
+          </a:xfrm>
+        </p:spPr>
+        <p:txBody>
+          <a:bodyPr/>
+          <a:lstStyle/>
+          <a:p>
+            <a:r>
+              <a:rPr lang="en-US" altLang="ko-KR" dirty="0" smtClean="0">
+                <a:solidFill>
+                  <a:srgbClr val="C00000"/>
+                </a:solidFill>
+                <a:latin typeface="-윤고딕310" panose="02030504000101010101" pitchFamily="18" charset="-127"/>
+                <a:ea typeface="-윤고딕310" panose="02030504000101010101" pitchFamily="18" charset="-127"/>
+              </a:rPr>
+              <a:t>2D </a:t>
+            </a:r>
+            <a:r>
+              <a:rPr lang="ko-KR" altLang="en-US" dirty="0" smtClean="0">
+                <a:solidFill>
+                  <a:srgbClr val="C00000"/>
+                </a:solidFill>
+                <a:latin typeface="-윤고딕310" panose="02030504000101010101" pitchFamily="18" charset="-127"/>
+                <a:ea typeface="-윤고딕310" panose="02030504000101010101" pitchFamily="18" charset="-127"/>
+              </a:rPr>
+              <a:t>게임 프로그래밍</a:t>
+            </a:r>
+            <a:endParaRPr lang="ko-KR" altLang="en-US" dirty="0">
+              <a:solidFill>
+                <a:srgbClr val="C00000"/>
+              </a:solidFill>
+              <a:latin typeface="-윤고딕310" panose="02030504000101010101" pitchFamily="18" charset="-127"/>
+              <a:ea typeface="-윤고딕310" panose="02030504000101010101" pitchFamily="18" charset="-127"/>
+            </a:endParaRPr>
+          </a:p>
+        </p:txBody>
+      </p:sp>
+    </p:spTree>
+    <p:extLst>
+      <p:ext uri="{BB962C8B-B14F-4D97-AF65-F5344CB8AC3E}">
+        <p14:creationId xmlns:p14="http://schemas.microsoft.com/office/powerpoint/2010/main" val="4146251140"/>
+      </p:ext>
+    </p:extLst>
+  </p:cSld>
+  <p:clrMapOvr>
+    <a:masterClrMapping/>
+  </p:clrMapOvr>
+  <p:timing>
+    <p:tnLst>
+      <p:par>
+        <p:cTn id="1" dur="indefinite" restart="never" nodeType="tmRoot"/>
+      </p:par>
+    </p:tnLst>
+  </p:timing>
+</p:sld>
+</file>
+
+<file path=ppt/slides/slide12.xml><?xml version="1.0" encoding="utf-8"?>
 <p:sld xmlns:a="http://schemas.openxmlformats.org/drawingml/2006/main" xmlns:r="http://schemas.openxmlformats.org/officeDocument/2006/relationships" xmlns:p="http://schemas.openxmlformats.org/presentationml/2006/main">
   <p:cSld>
     <p:spTree>
@@ -7550,7 +8938,7 @@
           <a:p>
             <a:fld id="{E64E4686-FFDF-4469-BE9B-A5EC149CF7A5}" type="datetime1">
               <a:rPr lang="ko-KR" altLang="en-US" smtClean="0"/>
-              <a:t>2017-10-16</a:t>
+              <a:t>2017-10-17</a:t>
             </a:fld>
             <a:endParaRPr lang="ko-KR" altLang="en-US"/>
           </a:p>
@@ -7578,7 +8966,7 @@
           <a:p>
             <a:fld id="{8ED71C24-08E4-4AF3-BCF3-1A22B934883E}" type="slidenum">
               <a:rPr lang="ko-KR" altLang="en-US" smtClean="0"/>
-              <a:t>11</a:t>
+              <a:t>12</a:t>
             </a:fld>
             <a:endParaRPr lang="ko-KR" altLang="en-US"/>
           </a:p>
@@ -7828,7 +9216,7 @@
           <a:p>
             <a:fld id="{99C85210-9BD9-410B-8B60-1A01FEADF4C9}" type="datetime1">
               <a:rPr lang="ko-KR" altLang="en-US" smtClean="0"/>
-              <a:t>2017-10-16</a:t>
+              <a:t>2017-10-17</a:t>
             </a:fld>
             <a:endParaRPr lang="ko-KR" altLang="en-US"/>
           </a:p>
@@ -8003,14 +9391,14 @@
           <a:lstStyle/>
           <a:p>
             <a:r>
-              <a:rPr lang="ko-KR" altLang="en-US" sz="2300" smtClean="0">
+              <a:rPr lang="ko-KR" altLang="en-US" sz="2300" dirty="0" smtClean="0">
                 <a:latin typeface="-윤고딕310" panose="02030504000101010101" pitchFamily="18" charset="-127"/>
                 <a:ea typeface="-윤고딕310" panose="02030504000101010101" pitchFamily="18" charset="-127"/>
               </a:rPr>
               <a:t>플레이어는 어느 중세의 흡혈귀가 되어 인간들로부터 도망쳐야 한다</a:t>
             </a:r>
             <a:r>
-              <a:rPr lang="en-US" altLang="ko-KR" sz="2300" smtClean="0">
+              <a:rPr lang="en-US" altLang="ko-KR" sz="2300" dirty="0" smtClean="0">
                 <a:latin typeface="-윤고딕310" panose="02030504000101010101" pitchFamily="18" charset="-127"/>
                 <a:ea typeface="-윤고딕310" panose="02030504000101010101" pitchFamily="18" charset="-127"/>
               </a:rPr>
@@ -8018,75 +9406,75 @@
             </a:r>
           </a:p>
           <a:p>
-            <a:endParaRPr lang="en-US" altLang="ko-KR" sz="2300" smtClean="0">
+            <a:endParaRPr lang="en-US" altLang="ko-KR" sz="2300" dirty="0" smtClean="0">
               <a:latin typeface="-윤고딕310" panose="02030504000101010101" pitchFamily="18" charset="-127"/>
               <a:ea typeface="-윤고딕310" panose="02030504000101010101" pitchFamily="18" charset="-127"/>
             </a:endParaRPr>
           </a:p>
           <a:p>
             <a:r>
-              <a:rPr lang="ko-KR" altLang="en-US" sz="2300" smtClean="0">
+              <a:rPr lang="ko-KR" altLang="en-US" sz="2300" dirty="0" smtClean="0">
                 <a:latin typeface="-윤고딕310" panose="02030504000101010101" pitchFamily="18" charset="-127"/>
                 <a:ea typeface="-윤고딕310" panose="02030504000101010101" pitchFamily="18" charset="-127"/>
               </a:rPr>
               <a:t>무언가 화려한 것을 보여주기 보다는 스토리에 집중할 수 있게 한다</a:t>
             </a:r>
             <a:r>
-              <a:rPr lang="en-US" altLang="ko-KR" sz="2300" smtClean="0">
+              <a:rPr lang="en-US" altLang="ko-KR" sz="2300" dirty="0" smtClean="0">
                 <a:latin typeface="-윤고딕310" panose="02030504000101010101" pitchFamily="18" charset="-127"/>
                 <a:ea typeface="-윤고딕310" panose="02030504000101010101" pitchFamily="18" charset="-127"/>
               </a:rPr>
               <a:t>.</a:t>
             </a:r>
-            <a:endParaRPr lang="en-US" altLang="ko-KR" sz="2300">
+            <a:endParaRPr lang="en-US" altLang="ko-KR" sz="2300" dirty="0">
               <a:latin typeface="-윤고딕310" panose="02030504000101010101" pitchFamily="18" charset="-127"/>
               <a:ea typeface="-윤고딕310" panose="02030504000101010101" pitchFamily="18" charset="-127"/>
             </a:endParaRPr>
           </a:p>
           <a:p>
-            <a:endParaRPr lang="en-US" altLang="ko-KR" sz="2300" smtClean="0">
+            <a:endParaRPr lang="en-US" altLang="ko-KR" sz="2300" dirty="0" smtClean="0">
               <a:latin typeface="-윤고딕310" panose="02030504000101010101" pitchFamily="18" charset="-127"/>
               <a:ea typeface="-윤고딕310" panose="02030504000101010101" pitchFamily="18" charset="-127"/>
             </a:endParaRPr>
           </a:p>
           <a:p>
             <a:r>
-              <a:rPr lang="ko-KR" altLang="en-US" sz="2300" smtClean="0">
+              <a:rPr lang="ko-KR" altLang="en-US" sz="2300" dirty="0" smtClean="0">
                 <a:latin typeface="-윤고딕310" panose="02030504000101010101" pitchFamily="18" charset="-127"/>
                 <a:ea typeface="-윤고딕310" panose="02030504000101010101" pitchFamily="18" charset="-127"/>
               </a:rPr>
               <a:t>일반적인 방향키 조합으로 조작한다</a:t>
             </a:r>
             <a:r>
-              <a:rPr lang="en-US" altLang="ko-KR" sz="2300" smtClean="0">
+              <a:rPr lang="en-US" altLang="ko-KR" sz="2300" dirty="0" smtClean="0">
                 <a:latin typeface="-윤고딕310" panose="02030504000101010101" pitchFamily="18" charset="-127"/>
                 <a:ea typeface="-윤고딕310" panose="02030504000101010101" pitchFamily="18" charset="-127"/>
               </a:rPr>
               <a:t>. </a:t>
             </a:r>
             <a:r>
-              <a:rPr lang="ko-KR" altLang="en-US" sz="2300" smtClean="0">
+              <a:rPr lang="ko-KR" altLang="en-US" sz="2300" dirty="0" smtClean="0">
                 <a:latin typeface="-윤고딕310" panose="02030504000101010101" pitchFamily="18" charset="-127"/>
                 <a:ea typeface="-윤고딕310" panose="02030504000101010101" pitchFamily="18" charset="-127"/>
               </a:rPr>
               <a:t>메뉴 역시</a:t>
             </a:r>
             <a:r>
-              <a:rPr lang="en-US" altLang="ko-KR" sz="2300">
+              <a:rPr lang="en-US" altLang="ko-KR" sz="2300" dirty="0">
                 <a:latin typeface="-윤고딕310" panose="02030504000101010101" pitchFamily="18" charset="-127"/>
                 <a:ea typeface="-윤고딕310" panose="02030504000101010101" pitchFamily="18" charset="-127"/>
               </a:rPr>
               <a:t> </a:t>
             </a:r>
             <a:r>
-              <a:rPr lang="ko-KR" altLang="en-US" sz="2300" smtClean="0">
+              <a:rPr lang="ko-KR" altLang="en-US" sz="2300" dirty="0" smtClean="0">
                 <a:latin typeface="-윤고딕310" panose="02030504000101010101" pitchFamily="18" charset="-127"/>
                 <a:ea typeface="-윤고딕310" panose="02030504000101010101" pitchFamily="18" charset="-127"/>
               </a:rPr>
               <a:t>마우스를 쓰지 않는다</a:t>
             </a:r>
             <a:r>
-              <a:rPr lang="en-US" altLang="ko-KR" sz="2300" smtClean="0">
+              <a:rPr lang="en-US" altLang="ko-KR" sz="2300" dirty="0" smtClean="0">
                 <a:latin typeface="-윤고딕310" panose="02030504000101010101" pitchFamily="18" charset="-127"/>
                 <a:ea typeface="-윤고딕310" panose="02030504000101010101" pitchFamily="18" charset="-127"/>
               </a:rPr>
@@ -8117,7 +9505,7 @@
           <a:p>
             <a:fld id="{80913EDC-9206-426E-951D-E7E0B75694AE}" type="datetime1">
               <a:rPr lang="ko-KR" altLang="en-US" smtClean="0"/>
-              <a:t>2017-10-16</a:t>
+              <a:t>2017-10-17</a:t>
             </a:fld>
             <a:endParaRPr lang="ko-KR" altLang="en-US"/>
           </a:p>
@@ -8365,6 +9753,20 @@
                 <a:latin typeface="-윤고딕310" panose="02030504000101010101" pitchFamily="18" charset="-127"/>
                 <a:ea typeface="-윤고딕310" panose="02030504000101010101" pitchFamily="18" charset="-127"/>
               </a:rPr>
+              <a:t>슈퍼 마리오</a:t>
+            </a:r>
+            <a:r>
+              <a:rPr lang="en-US" altLang="ko-KR" sz="2300" dirty="0" smtClean="0">
+                <a:latin typeface="-윤고딕310" panose="02030504000101010101" pitchFamily="18" charset="-127"/>
+                <a:ea typeface="-윤고딕310" panose="02030504000101010101" pitchFamily="18" charset="-127"/>
+              </a:rPr>
+              <a:t>’,‘</a:t>
+            </a:r>
+            <a:r>
+              <a:rPr lang="ko-KR" altLang="en-US" sz="2300" dirty="0" smtClean="0">
+                <a:latin typeface="-윤고딕310" panose="02030504000101010101" pitchFamily="18" charset="-127"/>
+                <a:ea typeface="-윤고딕310" panose="02030504000101010101" pitchFamily="18" charset="-127"/>
+              </a:rPr>
               <a:t>동굴 이야기</a:t>
             </a:r>
             <a:r>
@@ -8379,7 +9781,89 @@
                 <a:latin typeface="-윤고딕310" panose="02030504000101010101" pitchFamily="18" charset="-127"/>
                 <a:ea typeface="-윤고딕310" panose="02030504000101010101" pitchFamily="18" charset="-127"/>
               </a:rPr>
-              <a:t>를 많이 참고할 생각</a:t>
+              <a:t>와 비슷한 느낌 추구</a:t>
+            </a:r>
+            <a:r>
+              <a:rPr lang="en-US" altLang="ko-KR" sz="2300" dirty="0">
+                <a:latin typeface="-윤고딕310" panose="02030504000101010101" pitchFamily="18" charset="-127"/>
+                <a:ea typeface="-윤고딕310" panose="02030504000101010101" pitchFamily="18" charset="-127"/>
+              </a:rPr>
+              <a:t>.</a:t>
+            </a:r>
+            <a:endParaRPr lang="en-US" altLang="ko-KR" sz="2300" dirty="0" smtClean="0">
+              <a:latin typeface="-윤고딕310" panose="02030504000101010101" pitchFamily="18" charset="-127"/>
+              <a:ea typeface="-윤고딕310" panose="02030504000101010101" pitchFamily="18" charset="-127"/>
+            </a:endParaRPr>
+          </a:p>
+          <a:p>
+            <a:endParaRPr lang="en-US" altLang="ko-KR" sz="2300" dirty="0">
+              <a:latin typeface="-윤고딕310" panose="02030504000101010101" pitchFamily="18" charset="-127"/>
+              <a:ea typeface="-윤고딕310" panose="02030504000101010101" pitchFamily="18" charset="-127"/>
+            </a:endParaRPr>
+          </a:p>
+          <a:p>
+            <a:r>
+              <a:rPr lang="ko-KR" altLang="en-US" sz="2300" dirty="0" smtClean="0">
+                <a:latin typeface="-윤고딕310" panose="02030504000101010101" pitchFamily="18" charset="-127"/>
+                <a:ea typeface="-윤고딕310" panose="02030504000101010101" pitchFamily="18" charset="-127"/>
+              </a:rPr>
+              <a:t>모바일 </a:t>
+            </a:r>
+            <a:r>
+              <a:rPr lang="ko-KR" altLang="en-US" sz="2300" dirty="0">
+                <a:latin typeface="-윤고딕310" panose="02030504000101010101" pitchFamily="18" charset="-127"/>
+                <a:ea typeface="-윤고딕310" panose="02030504000101010101" pitchFamily="18" charset="-127"/>
+              </a:rPr>
+              <a:t>게임</a:t>
+            </a:r>
+            <a:r>
+              <a:rPr lang="en-US" altLang="ko-KR" sz="2300" dirty="0">
+                <a:latin typeface="-윤고딕310" panose="02030504000101010101" pitchFamily="18" charset="-127"/>
+                <a:ea typeface="-윤고딕310" panose="02030504000101010101" pitchFamily="18" charset="-127"/>
+              </a:rPr>
+              <a:t>‘</a:t>
+            </a:r>
+            <a:r>
+              <a:rPr lang="ko-KR" altLang="en-US" sz="2300" dirty="0">
+                <a:latin typeface="-윤고딕310" panose="02030504000101010101" pitchFamily="18" charset="-127"/>
+                <a:ea typeface="-윤고딕310" panose="02030504000101010101" pitchFamily="18" charset="-127"/>
+              </a:rPr>
+              <a:t>모뉴먼트</a:t>
+            </a:r>
+            <a:r>
+              <a:rPr lang="en-US" altLang="ko-KR" sz="2300" dirty="0" smtClean="0">
+                <a:latin typeface="-윤고딕310" panose="02030504000101010101" pitchFamily="18" charset="-127"/>
+                <a:ea typeface="-윤고딕310" panose="02030504000101010101" pitchFamily="18" charset="-127"/>
+              </a:rPr>
+              <a:t>’</a:t>
+            </a:r>
+            <a:r>
+              <a:rPr lang="ko-KR" altLang="en-US" sz="2300" dirty="0" smtClean="0">
+                <a:latin typeface="-윤고딕310" panose="02030504000101010101" pitchFamily="18" charset="-127"/>
+                <a:ea typeface="-윤고딕310" panose="02030504000101010101" pitchFamily="18" charset="-127"/>
+              </a:rPr>
+              <a:t>같이 정적인 </a:t>
+            </a:r>
+            <a:r>
+              <a:rPr lang="ko-KR" altLang="en-US" sz="2300" dirty="0" smtClean="0">
+                <a:latin typeface="-윤고딕310" panose="02030504000101010101" pitchFamily="18" charset="-127"/>
+                <a:ea typeface="-윤고딕310" panose="02030504000101010101" pitchFamily="18" charset="-127"/>
+              </a:rPr>
+              <a:t>진행이지만</a:t>
+            </a:r>
+            <a:r>
+              <a:rPr lang="en-US" altLang="ko-KR" sz="2300" dirty="0" smtClean="0">
+                <a:latin typeface="-윤고딕310" panose="02030504000101010101" pitchFamily="18" charset="-127"/>
+                <a:ea typeface="-윤고딕310" panose="02030504000101010101" pitchFamily="18" charset="-127"/>
+              </a:rPr>
+              <a:t>, </a:t>
+            </a:r>
+            <a:r>
+              <a:rPr lang="ko-KR" altLang="en-US" sz="2300" dirty="0" smtClean="0">
+                <a:latin typeface="-윤고딕310" panose="02030504000101010101" pitchFamily="18" charset="-127"/>
+                <a:ea typeface="-윤고딕310" panose="02030504000101010101" pitchFamily="18" charset="-127"/>
+              </a:rPr>
+              <a:t>전투 시스템에선 액션 성을 돋보인다</a:t>
             </a:r>
             <a:r>
               <a:rPr lang="en-US" altLang="ko-KR" sz="2300" dirty="0" smtClean="0">
@@ -8387,56 +9871,6 @@
                 <a:ea typeface="-윤고딕310" panose="02030504000101010101" pitchFamily="18" charset="-127"/>
               </a:rPr>
               <a:t>.</a:t>
-            </a:r>
-          </a:p>
-          <a:p>
-            <a:endParaRPr lang="en-US" altLang="ko-KR" sz="2300" dirty="0">
-              <a:latin typeface="-윤고딕310" panose="02030504000101010101" pitchFamily="18" charset="-127"/>
-              <a:ea typeface="-윤고딕310" panose="02030504000101010101" pitchFamily="18" charset="-127"/>
-            </a:endParaRPr>
-          </a:p>
-          <a:p>
-            <a:r>
-              <a:rPr lang="ko-KR" altLang="en-US" sz="2300" dirty="0" smtClean="0">
-                <a:latin typeface="-윤고딕310" panose="02030504000101010101" pitchFamily="18" charset="-127"/>
-                <a:ea typeface="-윤고딕310" panose="02030504000101010101" pitchFamily="18" charset="-127"/>
-              </a:rPr>
-              <a:t>모바일 </a:t>
-            </a:r>
-            <a:r>
-              <a:rPr lang="ko-KR" altLang="en-US" sz="2300" dirty="0">
-                <a:latin typeface="-윤고딕310" panose="02030504000101010101" pitchFamily="18" charset="-127"/>
-                <a:ea typeface="-윤고딕310" panose="02030504000101010101" pitchFamily="18" charset="-127"/>
-              </a:rPr>
-              <a:t>게임</a:t>
-            </a:r>
-            <a:r>
-              <a:rPr lang="en-US" altLang="ko-KR" sz="2300" dirty="0">
-                <a:latin typeface="-윤고딕310" panose="02030504000101010101" pitchFamily="18" charset="-127"/>
-                <a:ea typeface="-윤고딕310" panose="02030504000101010101" pitchFamily="18" charset="-127"/>
-              </a:rPr>
-              <a:t>‘</a:t>
-            </a:r>
-            <a:r>
-              <a:rPr lang="ko-KR" altLang="en-US" sz="2300" dirty="0">
-                <a:latin typeface="-윤고딕310" panose="02030504000101010101" pitchFamily="18" charset="-127"/>
-                <a:ea typeface="-윤고딕310" panose="02030504000101010101" pitchFamily="18" charset="-127"/>
-              </a:rPr>
-              <a:t>모뉴먼트</a:t>
-            </a:r>
-            <a:r>
-              <a:rPr lang="en-US" altLang="ko-KR" sz="2300" dirty="0" smtClean="0">
-                <a:latin typeface="-윤고딕310" panose="02030504000101010101" pitchFamily="18" charset="-127"/>
-                <a:ea typeface="-윤고딕310" panose="02030504000101010101" pitchFamily="18" charset="-127"/>
-              </a:rPr>
-              <a:t>’</a:t>
-            </a:r>
-            <a:r>
-              <a:rPr lang="ko-KR" altLang="en-US" sz="2300" dirty="0" smtClean="0">
-                <a:latin typeface="-윤고딕310" panose="02030504000101010101" pitchFamily="18" charset="-127"/>
-                <a:ea typeface="-윤고딕310" panose="02030504000101010101" pitchFamily="18" charset="-127"/>
-              </a:rPr>
-              <a:t>같이 정적인 진행이지만 </a:t>
             </a:r>
             <a:endParaRPr lang="en-US" altLang="ko-KR" sz="2300" dirty="0">
               <a:latin typeface="-윤고딕310" panose="02030504000101010101" pitchFamily="18" charset="-127"/>
@@ -8482,7 +9916,7 @@
           <a:p>
             <a:fld id="{80913EDC-9206-426E-951D-E7E0B75694AE}" type="datetime1">
               <a:rPr lang="ko-KR" altLang="en-US" smtClean="0"/>
-              <a:t>2017-10-16</a:t>
+              <a:t>2017-10-17</a:t>
             </a:fld>
             <a:endParaRPr lang="ko-KR" altLang="en-US"/>
           </a:p>
@@ -8702,7 +10136,7 @@
           <a:p>
             <a:fld id="{1DFADF30-901F-49C8-A3B5-BD350A95808D}" type="datetime1">
               <a:rPr lang="ko-KR" altLang="en-US" smtClean="0"/>
-              <a:t>2017-10-16</a:t>
+              <a:t>2017-10-17</a:t>
             </a:fld>
             <a:endParaRPr lang="ko-KR" altLang="en-US"/>
           </a:p>
@@ -8922,7 +10356,7 @@
           <a:p>
             <a:fld id="{1DFADF30-901F-49C8-A3B5-BD350A95808D}" type="datetime1">
               <a:rPr lang="ko-KR" altLang="en-US" smtClean="0"/>
-              <a:t>2017-10-16</a:t>
+              <a:t>2017-10-17</a:t>
             </a:fld>
             <a:endParaRPr lang="ko-KR" altLang="en-US"/>
           </a:p>
@@ -9115,62 +10549,62 @@
               <a:buAutoNum type="arabicPeriod"/>
             </a:pPr>
             <a:r>
-              <a:rPr lang="ko-KR" altLang="en-US" sz="2300" smtClean="0">
+              <a:rPr lang="ko-KR" altLang="en-US" sz="2300" dirty="0" smtClean="0">
                 <a:latin typeface="-윤고딕310" panose="02030504000101010101" pitchFamily="18" charset="-127"/>
                 <a:ea typeface="-윤고딕310" panose="02030504000101010101" pitchFamily="18" charset="-127"/>
               </a:rPr>
               <a:t>플랫폼 게임이므로 중력이 작용하는 물체</a:t>
             </a:r>
             <a:r>
-              <a:rPr lang="en-US" altLang="ko-KR" sz="2300" smtClean="0">
+              <a:rPr lang="en-US" altLang="ko-KR" sz="2300" dirty="0" smtClean="0">
                 <a:latin typeface="-윤고딕310" panose="02030504000101010101" pitchFamily="18" charset="-127"/>
                 <a:ea typeface="-윤고딕310" panose="02030504000101010101" pitchFamily="18" charset="-127"/>
               </a:rPr>
               <a:t>, </a:t>
             </a:r>
             <a:r>
-              <a:rPr lang="ko-KR" altLang="en-US" sz="2300" smtClean="0">
+              <a:rPr lang="ko-KR" altLang="en-US" sz="2300" dirty="0" smtClean="0">
                 <a:latin typeface="-윤고딕310" panose="02030504000101010101" pitchFamily="18" charset="-127"/>
                 <a:ea typeface="-윤고딕310" panose="02030504000101010101" pitchFamily="18" charset="-127"/>
               </a:rPr>
               <a:t>그리고</a:t>
             </a:r>
             <a:r>
-              <a:rPr lang="en-US" altLang="ko-KR" sz="2300" smtClean="0">
+              <a:rPr lang="en-US" altLang="ko-KR" sz="2300" dirty="0" smtClean="0">
                 <a:latin typeface="-윤고딕310" panose="02030504000101010101" pitchFamily="18" charset="-127"/>
                 <a:ea typeface="-윤고딕310" panose="02030504000101010101" pitchFamily="18" charset="-127"/>
               </a:rPr>
               <a:t> </a:t>
             </a:r>
             <a:r>
-              <a:rPr lang="ko-KR" altLang="en-US" sz="2300" smtClean="0">
+              <a:rPr lang="ko-KR" altLang="en-US" sz="2300" dirty="0" smtClean="0">
                 <a:latin typeface="-윤고딕310" panose="02030504000101010101" pitchFamily="18" charset="-127"/>
                 <a:ea typeface="-윤고딕310" panose="02030504000101010101" pitchFamily="18" charset="-127"/>
               </a:rPr>
               <a:t>블록과 블록</a:t>
             </a:r>
             <a:r>
-              <a:rPr lang="en-US" altLang="ko-KR" sz="2300" smtClean="0">
+              <a:rPr lang="en-US" altLang="ko-KR" sz="2300" dirty="0" smtClean="0">
                 <a:latin typeface="-윤고딕310" panose="02030504000101010101" pitchFamily="18" charset="-127"/>
                 <a:ea typeface="-윤고딕310" panose="02030504000101010101" pitchFamily="18" charset="-127"/>
               </a:rPr>
               <a:t>, </a:t>
             </a:r>
             <a:r>
-              <a:rPr lang="ko-KR" altLang="en-US" sz="2300" smtClean="0">
+              <a:rPr lang="ko-KR" altLang="en-US" sz="2300" dirty="0" smtClean="0">
                 <a:latin typeface="-윤고딕310" panose="02030504000101010101" pitchFamily="18" charset="-127"/>
                 <a:ea typeface="-윤고딕310" panose="02030504000101010101" pitchFamily="18" charset="-127"/>
               </a:rPr>
               <a:t>물체와 물체의 충돌을 구현해야 한다</a:t>
             </a:r>
             <a:r>
-              <a:rPr lang="en-US" altLang="ko-KR" sz="2300" smtClean="0">
+              <a:rPr lang="en-US" altLang="ko-KR" sz="2300" dirty="0" smtClean="0">
                 <a:latin typeface="-윤고딕310" panose="02030504000101010101" pitchFamily="18" charset="-127"/>
                 <a:ea typeface="-윤고딕310" panose="02030504000101010101" pitchFamily="18" charset="-127"/>
               </a:rPr>
               <a:t>.</a:t>
             </a:r>
-            <a:endParaRPr lang="en-US" altLang="ko-KR" sz="2300">
+            <a:endParaRPr lang="en-US" altLang="ko-KR" sz="2300" dirty="0">
               <a:latin typeface="-윤고딕310" panose="02030504000101010101" pitchFamily="18" charset="-127"/>
               <a:ea typeface="-윤고딕310" panose="02030504000101010101" pitchFamily="18" charset="-127"/>
             </a:endParaRPr>
@@ -9181,13 +10615,13 @@
               <a:buAutoNum type="arabicPeriod"/>
             </a:pPr>
             <a:r>
-              <a:rPr lang="ko-KR" altLang="en-US" sz="2300" smtClean="0">
+              <a:rPr lang="ko-KR" altLang="en-US" sz="2300" dirty="0" smtClean="0">
                 <a:latin typeface="-윤고딕310" panose="02030504000101010101" pitchFamily="18" charset="-127"/>
                 <a:ea typeface="-윤고딕310" panose="02030504000101010101" pitchFamily="18" charset="-127"/>
               </a:rPr>
               <a:t>플레이어 캐릭터의 조작 구현</a:t>
             </a:r>
-            <a:endParaRPr lang="en-US" altLang="ko-KR" sz="2300">
+            <a:endParaRPr lang="en-US" altLang="ko-KR" sz="2300" dirty="0">
               <a:latin typeface="-윤고딕310" panose="02030504000101010101" pitchFamily="18" charset="-127"/>
               <a:ea typeface="-윤고딕310" panose="02030504000101010101" pitchFamily="18" charset="-127"/>
             </a:endParaRPr>
@@ -9198,27 +10632,27 @@
               <a:buAutoNum type="arabicPeriod"/>
             </a:pPr>
             <a:r>
-              <a:rPr lang="ko-KR" altLang="en-US" sz="2300" smtClean="0">
+              <a:rPr lang="ko-KR" altLang="en-US" sz="2300" dirty="0" smtClean="0">
                 <a:latin typeface="-윤고딕310" panose="02030504000101010101" pitchFamily="18" charset="-127"/>
                 <a:ea typeface="-윤고딕310" panose="02030504000101010101" pitchFamily="18" charset="-127"/>
               </a:rPr>
               <a:t>적들의 인공지능</a:t>
             </a:r>
             <a:r>
-              <a:rPr lang="en-US" altLang="ko-KR" sz="2300">
+              <a:rPr lang="en-US" altLang="ko-KR" sz="2300" dirty="0">
                 <a:latin typeface="-윤고딕310" panose="02030504000101010101" pitchFamily="18" charset="-127"/>
                 <a:ea typeface="-윤고딕310" panose="02030504000101010101" pitchFamily="18" charset="-127"/>
               </a:rPr>
               <a:t> </a:t>
             </a:r>
             <a:r>
-              <a:rPr lang="ko-KR" altLang="en-US" sz="2300" smtClean="0">
+              <a:rPr lang="ko-KR" altLang="en-US" sz="2300" dirty="0" smtClean="0">
                 <a:latin typeface="-윤고딕310" panose="02030504000101010101" pitchFamily="18" charset="-127"/>
                 <a:ea typeface="-윤고딕310" panose="02030504000101010101" pitchFamily="18" charset="-127"/>
               </a:rPr>
               <a:t>구현</a:t>
             </a:r>
-            <a:endParaRPr lang="en-US" altLang="ko-KR" sz="2300">
+            <a:endParaRPr lang="en-US" altLang="ko-KR" sz="2300" dirty="0">
               <a:latin typeface="-윤고딕310" panose="02030504000101010101" pitchFamily="18" charset="-127"/>
               <a:ea typeface="-윤고딕310" panose="02030504000101010101" pitchFamily="18" charset="-127"/>
             </a:endParaRPr>
@@ -9229,14 +10663,14 @@
               <a:buAutoNum type="arabicPeriod"/>
             </a:pPr>
             <a:r>
-              <a:rPr lang="ko-KR" altLang="en-US" sz="2300" smtClean="0">
+              <a:rPr lang="ko-KR" altLang="en-US" sz="2300" dirty="0" smtClean="0">
                 <a:latin typeface="-윤고딕310" panose="02030504000101010101" pitchFamily="18" charset="-127"/>
                 <a:ea typeface="-윤고딕310" panose="02030504000101010101" pitchFamily="18" charset="-127"/>
               </a:rPr>
               <a:t>리소스 제작 혹은 공수해오기</a:t>
             </a:r>
             <a:r>
-              <a:rPr lang="en-US" altLang="ko-KR" sz="2300" smtClean="0">
+              <a:rPr lang="en-US" altLang="ko-KR" sz="2300" dirty="0" smtClean="0">
                 <a:latin typeface="-윤고딕310" panose="02030504000101010101" pitchFamily="18" charset="-127"/>
                 <a:ea typeface="-윤고딕310" panose="02030504000101010101" pitchFamily="18" charset="-127"/>
               </a:rPr>
@@ -9249,13 +10683,13 @@
               <a:buAutoNum type="arabicPeriod"/>
             </a:pPr>
             <a:r>
-              <a:rPr lang="ko-KR" altLang="en-US" sz="2300" smtClean="0">
+              <a:rPr lang="ko-KR" altLang="en-US" sz="2300" dirty="0" smtClean="0">
                 <a:latin typeface="-윤고딕310" panose="02030504000101010101" pitchFamily="18" charset="-127"/>
                 <a:ea typeface="-윤고딕310" panose="02030504000101010101" pitchFamily="18" charset="-127"/>
               </a:rPr>
               <a:t>유저 인터페이스</a:t>
             </a:r>
-            <a:endParaRPr lang="en-US" altLang="ko-KR" sz="2300">
+            <a:endParaRPr lang="en-US" altLang="ko-KR" sz="2300" dirty="0">
               <a:latin typeface="-윤고딕310" panose="02030504000101010101" pitchFamily="18" charset="-127"/>
               <a:ea typeface="-윤고딕310" panose="02030504000101010101" pitchFamily="18" charset="-127"/>
             </a:endParaRPr>
@@ -9284,7 +10718,7 @@
           <a:p>
             <a:fld id="{E63BED42-B56B-487C-A576-F8E55AE26EFB}" type="datetime1">
               <a:rPr lang="ko-KR" altLang="en-US" smtClean="0"/>
-              <a:t>2017-10-16</a:t>
+              <a:t>2017-10-17</a:t>
             </a:fld>
             <a:endParaRPr lang="ko-KR" altLang="en-US"/>
           </a:p>
@@ -10295,10 +11729,6 @@
                         </a:rPr>
                         <a:t>.</a:t>
                       </a:r>
-                      <a:endParaRPr lang="en-US" altLang="ko-KR" sz="1200" dirty="0" smtClean="0">
-                        <a:latin typeface="-윤고딕310" panose="02030504000101010101" pitchFamily="18" charset="-127"/>
-                        <a:ea typeface="-윤고딕310" panose="02030504000101010101" pitchFamily="18" charset="-127"/>
-                      </a:endParaRPr>
                     </a:p>
                     <a:p>
                       <a:pPr marL="285750" indent="-285750" latinLnBrk="1">
@@ -10396,7 +11826,7 @@
           <a:p>
             <a:fld id="{E63BED42-B56B-487C-A576-F8E55AE26EFB}" type="datetime1">
               <a:rPr lang="ko-KR" altLang="en-US" smtClean="0"/>
-              <a:t>2017-10-16</a:t>
+              <a:t>2017-10-17</a:t>
             </a:fld>
             <a:endParaRPr lang="ko-KR" altLang="en-US"/>
           </a:p>
@@ -10563,7 +11993,7 @@
             <p:ph idx="1"/>
             <p:extLst>
               <p:ext uri="{D42A27DB-BD31-4B8C-83A1-F6EECF244321}">
-                <p14:modId xmlns:p14="http://schemas.microsoft.com/office/powerpoint/2010/main" val="811520303"/>
+                <p14:modId xmlns:p14="http://schemas.microsoft.com/office/powerpoint/2010/main" val="4030410146"/>
               </p:ext>
             </p:extLst>
           </p:nvPr>
@@ -10590,7 +12020,7 @@
                 <a:gridCol w="4896544"/>
                 <a:gridCol w="1494676"/>
               </a:tblGrid>
-              <a:tr h="353771">
+              <a:tr h="144018">
                 <a:tc>
                   <a:txBody>
                     <a:bodyPr/>
@@ -10651,7 +12081,7 @@
                           <a:latin typeface="-윤고딕320" panose="02030504000101010101" pitchFamily="18" charset="-127"/>
                           <a:ea typeface="-윤고딕320" panose="02030504000101010101" pitchFamily="18" charset="-127"/>
                         </a:rPr>
-                        <a:t>비고</a:t>
+                        <a:t>추가</a:t>
                       </a:r>
                       <a:endParaRPr lang="ko-KR" altLang="en-US" sz="2000" b="0" dirty="0">
                         <a:latin typeface="-윤고딕320" panose="02030504000101010101" pitchFamily="18" charset="-127"/>
@@ -10841,7 +12271,21 @@
                     <a:lstStyle/>
                     <a:p>
                       <a:pPr latinLnBrk="1"/>
-                      <a:endParaRPr lang="ko-KR" altLang="en-US" sz="1400">
+                      <a:r>
+                        <a:rPr lang="en-US" altLang="ko-KR" sz="1400" dirty="0" smtClean="0">
+                          <a:latin typeface="-윤고딕310" panose="02030504000101010101" pitchFamily="18" charset="-127"/>
+                          <a:ea typeface="-윤고딕310" panose="02030504000101010101" pitchFamily="18" charset="-127"/>
+                        </a:rPr>
+                        <a:t>A* </a:t>
+                      </a:r>
+                      <a:r>
+                        <a:rPr lang="ko-KR" altLang="en-US" sz="1400" dirty="0" smtClean="0">
+                          <a:latin typeface="-윤고딕310" panose="02030504000101010101" pitchFamily="18" charset="-127"/>
+                          <a:ea typeface="-윤고딕310" panose="02030504000101010101" pitchFamily="18" charset="-127"/>
+                        </a:rPr>
+                        <a:t>같은 경로 탐색 알고리즘 사용</a:t>
+                      </a:r>
+                      <a:endParaRPr lang="ko-KR" altLang="en-US" sz="1400" dirty="0">
                         <a:latin typeface="-윤고딕310" panose="02030504000101010101" pitchFamily="18" charset="-127"/>
                         <a:ea typeface="-윤고딕310" panose="02030504000101010101" pitchFamily="18" charset="-127"/>
                       </a:endParaRPr>
@@ -11262,7 +12706,7 @@
           <a:p>
             <a:fld id="{E63BED42-B56B-487C-A576-F8E55AE26EFB}" type="datetime1">
               <a:rPr lang="ko-KR" altLang="en-US" smtClean="0"/>
-              <a:t>2017-10-16</a:t>
+              <a:t>2017-10-17</a:t>
             </a:fld>
             <a:endParaRPr lang="ko-KR" altLang="en-US"/>
           </a:p>

</xml_diff>